<commit_message>
Map Timeline Update & Fix
- Added maps through 225 BCE.
- Added missing conclusion to First Punic War in 241 BCE (oops).
- Added independent realm of Antiochus Hierax where historically relevant.
- Various other minor fixes, you might not even notice idk do y'all even read these
</commit_message>
<xml_diff>
--- a/Map Timeline.pptx
+++ b/Map Timeline.pptx
@@ -5,7 +5,7 @@
     <p:sldMasterId id="2147483660" r:id="rId1"/>
   </p:sldMasterIdLst>
   <p:notesMasterIdLst>
-    <p:notesMasterId r:id="rId37"/>
+    <p:notesMasterId r:id="rId42"/>
   </p:notesMasterIdLst>
   <p:sldIdLst>
     <p:sldId id="270" r:id="rId2"/>
@@ -41,8 +41,13 @@
     <p:sldId id="290" r:id="rId32"/>
     <p:sldId id="291" r:id="rId33"/>
     <p:sldId id="292" r:id="rId34"/>
-    <p:sldId id="293" r:id="rId35"/>
-    <p:sldId id="294" r:id="rId36"/>
+    <p:sldId id="298" r:id="rId35"/>
+    <p:sldId id="293" r:id="rId36"/>
+    <p:sldId id="294" r:id="rId37"/>
+    <p:sldId id="295" r:id="rId38"/>
+    <p:sldId id="296" r:id="rId39"/>
+    <p:sldId id="297" r:id="rId40"/>
+    <p:sldId id="299" r:id="rId41"/>
   </p:sldIdLst>
   <p:sldSz cx="12192000" cy="6858000"/>
   <p:notesSz cx="6858000" cy="9144000"/>
@@ -2903,7 +2908,7 @@
           <a:p>
             <a:fld id="{BEFD42AF-006F-46D7-B59B-3B047E7F57DC}" type="datetimeFigureOut">
               <a:rPr lang="en-US" smtClean="0"/>
-              <a:t>20-Aug-21</a:t>
+              <a:t>22-Aug-21</a:t>
             </a:fld>
             <a:endParaRPr lang="en-US"/>
           </a:p>
@@ -3412,7 +3417,7 @@
     </p:spTree>
     <p:extLst>
       <p:ext uri="{BB962C8B-B14F-4D97-AF65-F5344CB8AC3E}">
-        <p14:creationId xmlns:p14="http://schemas.microsoft.com/office/powerpoint/2010/main" val="3557929197"/>
+        <p14:creationId xmlns:p14="http://schemas.microsoft.com/office/powerpoint/2010/main" val="2953630258"/>
       </p:ext>
     </p:extLst>
   </p:cSld>
@@ -3496,7 +3501,427 @@
     </p:spTree>
     <p:extLst>
       <p:ext uri="{BB962C8B-B14F-4D97-AF65-F5344CB8AC3E}">
+        <p14:creationId xmlns:p14="http://schemas.microsoft.com/office/powerpoint/2010/main" val="3557929197"/>
+      </p:ext>
+    </p:extLst>
+  </p:cSld>
+  <p:clrMapOvr>
+    <a:masterClrMapping/>
+  </p:clrMapOvr>
+</p:notes>
+</file>
+
+<file path=ppt/notesSlides/notesSlide5.xml><?xml version="1.0" encoding="utf-8"?>
+<p:notes xmlns:a="http://schemas.openxmlformats.org/drawingml/2006/main" xmlns:r="http://schemas.openxmlformats.org/officeDocument/2006/relationships" xmlns:p="http://schemas.openxmlformats.org/presentationml/2006/main">
+  <p:cSld>
+    <p:spTree>
+      <p:nvGrpSpPr>
+        <p:cNvPr id="1" name=""/>
+        <p:cNvGrpSpPr/>
+        <p:nvPr/>
+      </p:nvGrpSpPr>
+      <p:grpSpPr>
+        <a:xfrm>
+          <a:off x="0" y="0"/>
+          <a:ext cx="0" cy="0"/>
+          <a:chOff x="0" y="0"/>
+          <a:chExt cx="0" cy="0"/>
+        </a:xfrm>
+      </p:grpSpPr>
+      <p:sp>
+        <p:nvSpPr>
+          <p:cNvPr id="2" name="Slide Image Placeholder 1"/>
+          <p:cNvSpPr>
+            <a:spLocks noGrp="1" noRot="1" noChangeAspect="1"/>
+          </p:cNvSpPr>
+          <p:nvPr>
+            <p:ph type="sldImg"/>
+          </p:nvPr>
+        </p:nvSpPr>
+        <p:spPr/>
+      </p:sp>
+      <p:sp>
+        <p:nvSpPr>
+          <p:cNvPr id="3" name="Notes Placeholder 2"/>
+          <p:cNvSpPr>
+            <a:spLocks noGrp="1"/>
+          </p:cNvSpPr>
+          <p:nvPr>
+            <p:ph type="body" idx="1"/>
+          </p:nvPr>
+        </p:nvSpPr>
+        <p:spPr/>
+        <p:txBody>
+          <a:bodyPr/>
+          <a:lstStyle/>
+          <a:p>
+            <a:endParaRPr lang="en-US" dirty="0"/>
+          </a:p>
+        </p:txBody>
+      </p:sp>
+      <p:sp>
+        <p:nvSpPr>
+          <p:cNvPr id="4" name="Slide Number Placeholder 3"/>
+          <p:cNvSpPr>
+            <a:spLocks noGrp="1"/>
+          </p:cNvSpPr>
+          <p:nvPr>
+            <p:ph type="sldNum" sz="quarter" idx="5"/>
+          </p:nvPr>
+        </p:nvSpPr>
+        <p:spPr/>
+        <p:txBody>
+          <a:bodyPr/>
+          <a:lstStyle/>
+          <a:p>
+            <a:fld id="{F687679A-9FB6-43B6-864A-7FDC6149F2D5}" type="slidenum">
+              <a:rPr lang="en-US" smtClean="0"/>
+              <a:t>36</a:t>
+            </a:fld>
+            <a:endParaRPr lang="en-US"/>
+          </a:p>
+        </p:txBody>
+      </p:sp>
+    </p:spTree>
+    <p:extLst>
+      <p:ext uri="{BB962C8B-B14F-4D97-AF65-F5344CB8AC3E}">
         <p14:creationId xmlns:p14="http://schemas.microsoft.com/office/powerpoint/2010/main" val="3847934212"/>
+      </p:ext>
+    </p:extLst>
+  </p:cSld>
+  <p:clrMapOvr>
+    <a:masterClrMapping/>
+  </p:clrMapOvr>
+</p:notes>
+</file>
+
+<file path=ppt/notesSlides/notesSlide6.xml><?xml version="1.0" encoding="utf-8"?>
+<p:notes xmlns:a="http://schemas.openxmlformats.org/drawingml/2006/main" xmlns:r="http://schemas.openxmlformats.org/officeDocument/2006/relationships" xmlns:p="http://schemas.openxmlformats.org/presentationml/2006/main">
+  <p:cSld>
+    <p:spTree>
+      <p:nvGrpSpPr>
+        <p:cNvPr id="1" name=""/>
+        <p:cNvGrpSpPr/>
+        <p:nvPr/>
+      </p:nvGrpSpPr>
+      <p:grpSpPr>
+        <a:xfrm>
+          <a:off x="0" y="0"/>
+          <a:ext cx="0" cy="0"/>
+          <a:chOff x="0" y="0"/>
+          <a:chExt cx="0" cy="0"/>
+        </a:xfrm>
+      </p:grpSpPr>
+      <p:sp>
+        <p:nvSpPr>
+          <p:cNvPr id="2" name="Slide Image Placeholder 1"/>
+          <p:cNvSpPr>
+            <a:spLocks noGrp="1" noRot="1" noChangeAspect="1"/>
+          </p:cNvSpPr>
+          <p:nvPr>
+            <p:ph type="sldImg"/>
+          </p:nvPr>
+        </p:nvSpPr>
+        <p:spPr/>
+      </p:sp>
+      <p:sp>
+        <p:nvSpPr>
+          <p:cNvPr id="3" name="Notes Placeholder 2"/>
+          <p:cNvSpPr>
+            <a:spLocks noGrp="1"/>
+          </p:cNvSpPr>
+          <p:nvPr>
+            <p:ph type="body" idx="1"/>
+          </p:nvPr>
+        </p:nvSpPr>
+        <p:spPr/>
+        <p:txBody>
+          <a:bodyPr/>
+          <a:lstStyle/>
+          <a:p>
+            <a:endParaRPr lang="en-US" dirty="0"/>
+          </a:p>
+        </p:txBody>
+      </p:sp>
+      <p:sp>
+        <p:nvSpPr>
+          <p:cNvPr id="4" name="Slide Number Placeholder 3"/>
+          <p:cNvSpPr>
+            <a:spLocks noGrp="1"/>
+          </p:cNvSpPr>
+          <p:nvPr>
+            <p:ph type="sldNum" sz="quarter" idx="5"/>
+          </p:nvPr>
+        </p:nvSpPr>
+        <p:spPr/>
+        <p:txBody>
+          <a:bodyPr/>
+          <a:lstStyle/>
+          <a:p>
+            <a:fld id="{F687679A-9FB6-43B6-864A-7FDC6149F2D5}" type="slidenum">
+              <a:rPr lang="en-US" smtClean="0"/>
+              <a:t>37</a:t>
+            </a:fld>
+            <a:endParaRPr lang="en-US"/>
+          </a:p>
+        </p:txBody>
+      </p:sp>
+    </p:spTree>
+    <p:extLst>
+      <p:ext uri="{BB962C8B-B14F-4D97-AF65-F5344CB8AC3E}">
+        <p14:creationId xmlns:p14="http://schemas.microsoft.com/office/powerpoint/2010/main" val="2216338947"/>
+      </p:ext>
+    </p:extLst>
+  </p:cSld>
+  <p:clrMapOvr>
+    <a:masterClrMapping/>
+  </p:clrMapOvr>
+</p:notes>
+</file>
+
+<file path=ppt/notesSlides/notesSlide7.xml><?xml version="1.0" encoding="utf-8"?>
+<p:notes xmlns:a="http://schemas.openxmlformats.org/drawingml/2006/main" xmlns:r="http://schemas.openxmlformats.org/officeDocument/2006/relationships" xmlns:p="http://schemas.openxmlformats.org/presentationml/2006/main">
+  <p:cSld>
+    <p:spTree>
+      <p:nvGrpSpPr>
+        <p:cNvPr id="1" name=""/>
+        <p:cNvGrpSpPr/>
+        <p:nvPr/>
+      </p:nvGrpSpPr>
+      <p:grpSpPr>
+        <a:xfrm>
+          <a:off x="0" y="0"/>
+          <a:ext cx="0" cy="0"/>
+          <a:chOff x="0" y="0"/>
+          <a:chExt cx="0" cy="0"/>
+        </a:xfrm>
+      </p:grpSpPr>
+      <p:sp>
+        <p:nvSpPr>
+          <p:cNvPr id="2" name="Slide Image Placeholder 1"/>
+          <p:cNvSpPr>
+            <a:spLocks noGrp="1" noRot="1" noChangeAspect="1"/>
+          </p:cNvSpPr>
+          <p:nvPr>
+            <p:ph type="sldImg"/>
+          </p:nvPr>
+        </p:nvSpPr>
+        <p:spPr/>
+      </p:sp>
+      <p:sp>
+        <p:nvSpPr>
+          <p:cNvPr id="3" name="Notes Placeholder 2"/>
+          <p:cNvSpPr>
+            <a:spLocks noGrp="1"/>
+          </p:cNvSpPr>
+          <p:nvPr>
+            <p:ph type="body" idx="1"/>
+          </p:nvPr>
+        </p:nvSpPr>
+        <p:spPr/>
+        <p:txBody>
+          <a:bodyPr/>
+          <a:lstStyle/>
+          <a:p>
+            <a:endParaRPr lang="en-US" dirty="0"/>
+          </a:p>
+        </p:txBody>
+      </p:sp>
+      <p:sp>
+        <p:nvSpPr>
+          <p:cNvPr id="4" name="Slide Number Placeholder 3"/>
+          <p:cNvSpPr>
+            <a:spLocks noGrp="1"/>
+          </p:cNvSpPr>
+          <p:nvPr>
+            <p:ph type="sldNum" sz="quarter" idx="5"/>
+          </p:nvPr>
+        </p:nvSpPr>
+        <p:spPr/>
+        <p:txBody>
+          <a:bodyPr/>
+          <a:lstStyle/>
+          <a:p>
+            <a:fld id="{F687679A-9FB6-43B6-864A-7FDC6149F2D5}" type="slidenum">
+              <a:rPr lang="en-US" smtClean="0"/>
+              <a:t>38</a:t>
+            </a:fld>
+            <a:endParaRPr lang="en-US"/>
+          </a:p>
+        </p:txBody>
+      </p:sp>
+    </p:spTree>
+    <p:extLst>
+      <p:ext uri="{BB962C8B-B14F-4D97-AF65-F5344CB8AC3E}">
+        <p14:creationId xmlns:p14="http://schemas.microsoft.com/office/powerpoint/2010/main" val="2298335919"/>
+      </p:ext>
+    </p:extLst>
+  </p:cSld>
+  <p:clrMapOvr>
+    <a:masterClrMapping/>
+  </p:clrMapOvr>
+</p:notes>
+</file>
+
+<file path=ppt/notesSlides/notesSlide8.xml><?xml version="1.0" encoding="utf-8"?>
+<p:notes xmlns:a="http://schemas.openxmlformats.org/drawingml/2006/main" xmlns:r="http://schemas.openxmlformats.org/officeDocument/2006/relationships" xmlns:p="http://schemas.openxmlformats.org/presentationml/2006/main">
+  <p:cSld>
+    <p:spTree>
+      <p:nvGrpSpPr>
+        <p:cNvPr id="1" name=""/>
+        <p:cNvGrpSpPr/>
+        <p:nvPr/>
+      </p:nvGrpSpPr>
+      <p:grpSpPr>
+        <a:xfrm>
+          <a:off x="0" y="0"/>
+          <a:ext cx="0" cy="0"/>
+          <a:chOff x="0" y="0"/>
+          <a:chExt cx="0" cy="0"/>
+        </a:xfrm>
+      </p:grpSpPr>
+      <p:sp>
+        <p:nvSpPr>
+          <p:cNvPr id="2" name="Slide Image Placeholder 1"/>
+          <p:cNvSpPr>
+            <a:spLocks noGrp="1" noRot="1" noChangeAspect="1"/>
+          </p:cNvSpPr>
+          <p:nvPr>
+            <p:ph type="sldImg"/>
+          </p:nvPr>
+        </p:nvSpPr>
+        <p:spPr/>
+      </p:sp>
+      <p:sp>
+        <p:nvSpPr>
+          <p:cNvPr id="3" name="Notes Placeholder 2"/>
+          <p:cNvSpPr>
+            <a:spLocks noGrp="1"/>
+          </p:cNvSpPr>
+          <p:nvPr>
+            <p:ph type="body" idx="1"/>
+          </p:nvPr>
+        </p:nvSpPr>
+        <p:spPr/>
+        <p:txBody>
+          <a:bodyPr/>
+          <a:lstStyle/>
+          <a:p>
+            <a:endParaRPr lang="en-US" dirty="0"/>
+          </a:p>
+        </p:txBody>
+      </p:sp>
+      <p:sp>
+        <p:nvSpPr>
+          <p:cNvPr id="4" name="Slide Number Placeholder 3"/>
+          <p:cNvSpPr>
+            <a:spLocks noGrp="1"/>
+          </p:cNvSpPr>
+          <p:nvPr>
+            <p:ph type="sldNum" sz="quarter" idx="5"/>
+          </p:nvPr>
+        </p:nvSpPr>
+        <p:spPr/>
+        <p:txBody>
+          <a:bodyPr/>
+          <a:lstStyle/>
+          <a:p>
+            <a:fld id="{F687679A-9FB6-43B6-864A-7FDC6149F2D5}" type="slidenum">
+              <a:rPr lang="en-US" smtClean="0"/>
+              <a:t>39</a:t>
+            </a:fld>
+            <a:endParaRPr lang="en-US"/>
+          </a:p>
+        </p:txBody>
+      </p:sp>
+    </p:spTree>
+    <p:extLst>
+      <p:ext uri="{BB962C8B-B14F-4D97-AF65-F5344CB8AC3E}">
+        <p14:creationId xmlns:p14="http://schemas.microsoft.com/office/powerpoint/2010/main" val="2800859843"/>
+      </p:ext>
+    </p:extLst>
+  </p:cSld>
+  <p:clrMapOvr>
+    <a:masterClrMapping/>
+  </p:clrMapOvr>
+</p:notes>
+</file>
+
+<file path=ppt/notesSlides/notesSlide9.xml><?xml version="1.0" encoding="utf-8"?>
+<p:notes xmlns:a="http://schemas.openxmlformats.org/drawingml/2006/main" xmlns:r="http://schemas.openxmlformats.org/officeDocument/2006/relationships" xmlns:p="http://schemas.openxmlformats.org/presentationml/2006/main">
+  <p:cSld>
+    <p:spTree>
+      <p:nvGrpSpPr>
+        <p:cNvPr id="1" name=""/>
+        <p:cNvGrpSpPr/>
+        <p:nvPr/>
+      </p:nvGrpSpPr>
+      <p:grpSpPr>
+        <a:xfrm>
+          <a:off x="0" y="0"/>
+          <a:ext cx="0" cy="0"/>
+          <a:chOff x="0" y="0"/>
+          <a:chExt cx="0" cy="0"/>
+        </a:xfrm>
+      </p:grpSpPr>
+      <p:sp>
+        <p:nvSpPr>
+          <p:cNvPr id="2" name="Slide Image Placeholder 1"/>
+          <p:cNvSpPr>
+            <a:spLocks noGrp="1" noRot="1" noChangeAspect="1"/>
+          </p:cNvSpPr>
+          <p:nvPr>
+            <p:ph type="sldImg"/>
+          </p:nvPr>
+        </p:nvSpPr>
+        <p:spPr/>
+      </p:sp>
+      <p:sp>
+        <p:nvSpPr>
+          <p:cNvPr id="3" name="Notes Placeholder 2"/>
+          <p:cNvSpPr>
+            <a:spLocks noGrp="1"/>
+          </p:cNvSpPr>
+          <p:nvPr>
+            <p:ph type="body" idx="1"/>
+          </p:nvPr>
+        </p:nvSpPr>
+        <p:spPr/>
+        <p:txBody>
+          <a:bodyPr/>
+          <a:lstStyle/>
+          <a:p>
+            <a:endParaRPr lang="en-US" dirty="0"/>
+          </a:p>
+        </p:txBody>
+      </p:sp>
+      <p:sp>
+        <p:nvSpPr>
+          <p:cNvPr id="4" name="Slide Number Placeholder 3"/>
+          <p:cNvSpPr>
+            <a:spLocks noGrp="1"/>
+          </p:cNvSpPr>
+          <p:nvPr>
+            <p:ph type="sldNum" sz="quarter" idx="5"/>
+          </p:nvPr>
+        </p:nvSpPr>
+        <p:spPr/>
+        <p:txBody>
+          <a:bodyPr/>
+          <a:lstStyle/>
+          <a:p>
+            <a:fld id="{F687679A-9FB6-43B6-864A-7FDC6149F2D5}" type="slidenum">
+              <a:rPr lang="en-US" smtClean="0"/>
+              <a:t>40</a:t>
+            </a:fld>
+            <a:endParaRPr lang="en-US"/>
+          </a:p>
+        </p:txBody>
+      </p:sp>
+    </p:spTree>
+    <p:extLst>
+      <p:ext uri="{BB962C8B-B14F-4D97-AF65-F5344CB8AC3E}">
+        <p14:creationId xmlns:p14="http://schemas.microsoft.com/office/powerpoint/2010/main" val="3291593724"/>
       </p:ext>
     </p:extLst>
   </p:cSld>
@@ -3637,7 +4062,7 @@
           <a:p>
             <a:fld id="{A4604AD4-558F-449A-A004-D90B40E68DCA}" type="datetimeFigureOut">
               <a:rPr lang="en-US" smtClean="0"/>
-              <a:t>20-Aug-21</a:t>
+              <a:t>22-Aug-21</a:t>
             </a:fld>
             <a:endParaRPr lang="en-US"/>
           </a:p>
@@ -3807,7 +4232,7 @@
           <a:p>
             <a:fld id="{A4604AD4-558F-449A-A004-D90B40E68DCA}" type="datetimeFigureOut">
               <a:rPr lang="en-US" smtClean="0"/>
-              <a:t>20-Aug-21</a:t>
+              <a:t>22-Aug-21</a:t>
             </a:fld>
             <a:endParaRPr lang="en-US"/>
           </a:p>
@@ -3987,7 +4412,7 @@
           <a:p>
             <a:fld id="{A4604AD4-558F-449A-A004-D90B40E68DCA}" type="datetimeFigureOut">
               <a:rPr lang="en-US" smtClean="0"/>
-              <a:t>20-Aug-21</a:t>
+              <a:t>22-Aug-21</a:t>
             </a:fld>
             <a:endParaRPr lang="en-US"/>
           </a:p>
@@ -4157,7 +4582,7 @@
           <a:p>
             <a:fld id="{A4604AD4-558F-449A-A004-D90B40E68DCA}" type="datetimeFigureOut">
               <a:rPr lang="en-US" smtClean="0"/>
-              <a:t>20-Aug-21</a:t>
+              <a:t>22-Aug-21</a:t>
             </a:fld>
             <a:endParaRPr lang="en-US"/>
           </a:p>
@@ -4403,7 +4828,7 @@
           <a:p>
             <a:fld id="{A4604AD4-558F-449A-A004-D90B40E68DCA}" type="datetimeFigureOut">
               <a:rPr lang="en-US" smtClean="0"/>
-              <a:t>20-Aug-21</a:t>
+              <a:t>22-Aug-21</a:t>
             </a:fld>
             <a:endParaRPr lang="en-US"/>
           </a:p>
@@ -4635,7 +5060,7 @@
           <a:p>
             <a:fld id="{A4604AD4-558F-449A-A004-D90B40E68DCA}" type="datetimeFigureOut">
               <a:rPr lang="en-US" smtClean="0"/>
-              <a:t>20-Aug-21</a:t>
+              <a:t>22-Aug-21</a:t>
             </a:fld>
             <a:endParaRPr lang="en-US"/>
           </a:p>
@@ -5002,7 +5427,7 @@
           <a:p>
             <a:fld id="{A4604AD4-558F-449A-A004-D90B40E68DCA}" type="datetimeFigureOut">
               <a:rPr lang="en-US" smtClean="0"/>
-              <a:t>20-Aug-21</a:t>
+              <a:t>22-Aug-21</a:t>
             </a:fld>
             <a:endParaRPr lang="en-US"/>
           </a:p>
@@ -5120,7 +5545,7 @@
           <a:p>
             <a:fld id="{A4604AD4-558F-449A-A004-D90B40E68DCA}" type="datetimeFigureOut">
               <a:rPr lang="en-US" smtClean="0"/>
-              <a:t>20-Aug-21</a:t>
+              <a:t>22-Aug-21</a:t>
             </a:fld>
             <a:endParaRPr lang="en-US"/>
           </a:p>
@@ -5215,7 +5640,7 @@
           <a:p>
             <a:fld id="{A4604AD4-558F-449A-A004-D90B40E68DCA}" type="datetimeFigureOut">
               <a:rPr lang="en-US" smtClean="0"/>
-              <a:t>20-Aug-21</a:t>
+              <a:t>22-Aug-21</a:t>
             </a:fld>
             <a:endParaRPr lang="en-US"/>
           </a:p>
@@ -5492,7 +5917,7 @@
           <a:p>
             <a:fld id="{A4604AD4-558F-449A-A004-D90B40E68DCA}" type="datetimeFigureOut">
               <a:rPr lang="en-US" smtClean="0"/>
-              <a:t>20-Aug-21</a:t>
+              <a:t>22-Aug-21</a:t>
             </a:fld>
             <a:endParaRPr lang="en-US"/>
           </a:p>
@@ -5749,7 +6174,7 @@
           <a:p>
             <a:fld id="{A4604AD4-558F-449A-A004-D90B40E68DCA}" type="datetimeFigureOut">
               <a:rPr lang="en-US" smtClean="0"/>
-              <a:t>20-Aug-21</a:t>
+              <a:t>22-Aug-21</a:t>
             </a:fld>
             <a:endParaRPr lang="en-US"/>
           </a:p>
@@ -5962,7 +6387,7 @@
           <a:p>
             <a:fld id="{A4604AD4-558F-449A-A004-D90B40E68DCA}" type="datetimeFigureOut">
               <a:rPr lang="en-US" smtClean="0"/>
-              <a:t>20-Aug-21</a:t>
+              <a:t>22-Aug-21</a:t>
             </a:fld>
             <a:endParaRPr lang="en-US"/>
           </a:p>
@@ -6708,7 +7133,7 @@
         </p:spPr>
         <p:txBody>
           <a:bodyPr anchor="ctr">
-            <a:normAutofit fontScale="92500" lnSpcReduction="20000"/>
+            <a:normAutofit fontScale="77500" lnSpcReduction="20000"/>
           </a:bodyPr>
           <a:lstStyle/>
           <a:p>
@@ -6734,7 +7159,7 @@
             </a:r>
             <a:r>
               <a:rPr lang="en-US" dirty="0"/>
-              <a:t>, the creator of Lux Invicta. Most significant events that haven’t specifically been referenced or changed by </a:t>
+              <a:t>, the creator of Lux Invicta. Most historical events that are unreferenced by </a:t>
             </a:r>
             <a:r>
               <a:rPr lang="en-US" dirty="0" err="1"/>
@@ -6742,7 +7167,32 @@
             </a:r>
             <a:r>
               <a:rPr lang="en-US" dirty="0"/>
-              <a:t> are assumed to have happened as they did in our timeline. Additional details have been added to the timeline to explain the complex global relationships found in the world of Lux Invicta. Original content is always preserved in its entirety whenever possible, and changes are only made when necessary.</a:t>
+              <a:t> and don’t interfere with his changes are assumed to have happened as they did in our timeline. To help explain map changes, many of these details have been added and marked with an asterisk (*).</a:t>
+            </a:r>
+          </a:p>
+          <a:p>
+            <a:pPr marL="0" indent="0">
+              <a:buNone/>
+            </a:pPr>
+            <a:r>
+              <a:rPr lang="en-US" dirty="0"/>
+              <a:t>In addition to </a:t>
+            </a:r>
+            <a:r>
+              <a:rPr lang="en-US" dirty="0" err="1"/>
+              <a:t>Shaytana’s</a:t>
+            </a:r>
+            <a:r>
+              <a:rPr lang="en-US" dirty="0"/>
+              <a:t> timeline, more content has been written to help mesh the world of Lux Invicta with new areas of the map. As a rule, these additions will only target events that </a:t>
+            </a:r>
+            <a:r>
+              <a:rPr lang="en-US" dirty="0" err="1"/>
+              <a:t>Shaytana</a:t>
+            </a:r>
+            <a:r>
+              <a:rPr lang="en-US" dirty="0"/>
+              <a:t> hasn’t already mentioned, or ones that were only briefly referenced. Original content is always preserved in its entirety whenever possible, and changes are only made when necessary.</a:t>
             </a:r>
           </a:p>
           <a:p>
@@ -15104,7 +15554,7 @@
             </a:pPr>
             <a:r>
               <a:rPr lang="en-US" dirty="0"/>
-              <a:t>Eumenes I of Pergamum defeats Antiochus and founds an independent kingdom.</a:t>
+              <a:t>Eumenes I of Pergamon defeats Antiochus and founds an independent kingdom.</a:t>
             </a:r>
             <a:endParaRPr lang="en-US" i="1" dirty="0"/>
           </a:p>
@@ -20858,9 +21308,978 @@
           <a:chExt cx="0" cy="0"/>
         </a:xfrm>
       </p:grpSpPr>
+      <p:sp>
+        <p:nvSpPr>
+          <p:cNvPr id="4" name="TextBox 3">
+            <a:extLst>
+              <a:ext uri="{FF2B5EF4-FFF2-40B4-BE49-F238E27FC236}">
+                <a16:creationId xmlns:a16="http://schemas.microsoft.com/office/drawing/2014/main" id="{03DDB894-502D-4473-8189-C7F7050B360F}"/>
+              </a:ext>
+            </a:extLst>
+          </p:cNvPr>
+          <p:cNvSpPr txBox="1"/>
+          <p:nvPr/>
+        </p:nvSpPr>
+        <p:spPr>
+          <a:xfrm>
+            <a:off x="648931" y="2438401"/>
+            <a:ext cx="3667036" cy="3779520"/>
+          </a:xfrm>
+          <a:prstGeom prst="rect">
+            <a:avLst/>
+          </a:prstGeom>
+        </p:spPr>
+        <p:txBody>
+          <a:bodyPr vert="horz" lIns="91440" tIns="45720" rIns="91440" bIns="45720" rtlCol="0">
+            <a:normAutofit/>
+          </a:bodyPr>
+          <a:lstStyle/>
+          <a:p>
+            <a:pPr defTabSz="914400">
+              <a:lnSpc>
+                <a:spcPct val="90000"/>
+              </a:lnSpc>
+              <a:spcAft>
+                <a:spcPts val="600"/>
+              </a:spcAft>
+            </a:pPr>
+            <a:r>
+              <a:rPr lang="en-US" sz="2400" b="1" dirty="0">
+                <a:latin typeface="+mj-lt"/>
+              </a:rPr>
+              <a:t>243 BCE</a:t>
+            </a:r>
+          </a:p>
+          <a:p>
+            <a:pPr marL="285750" indent="-228600" defTabSz="914400">
+              <a:lnSpc>
+                <a:spcPct val="90000"/>
+              </a:lnSpc>
+              <a:spcAft>
+                <a:spcPts val="600"/>
+              </a:spcAft>
+              <a:buFont typeface="Arial" panose="020B0604020202020204" pitchFamily="34" charset="0"/>
+              <a:buChar char="•"/>
+            </a:pPr>
+            <a:r>
+              <a:rPr lang="en-US" dirty="0"/>
+              <a:t>Agis IV reforms the Spartan state under a new </a:t>
+            </a:r>
+            <a:r>
+              <a:rPr lang="en-US" dirty="0" err="1"/>
+              <a:t>Lycurgan</a:t>
+            </a:r>
+            <a:r>
+              <a:rPr lang="en-US" dirty="0"/>
+              <a:t> model. The entire Peloponnesus is turned into a militaristic state, with all </a:t>
+            </a:r>
+            <a:r>
+              <a:rPr lang="en-US" dirty="0" err="1"/>
+              <a:t>Hellens</a:t>
+            </a:r>
+            <a:r>
+              <a:rPr lang="en-US" dirty="0"/>
+              <a:t> gaining citizenship and with all young men being enrolled into the new Agoge system.</a:t>
+            </a:r>
+          </a:p>
+          <a:p>
+            <a:pPr marL="285750" indent="-228600" defTabSz="914400">
+              <a:lnSpc>
+                <a:spcPct val="90000"/>
+              </a:lnSpc>
+              <a:spcAft>
+                <a:spcPts val="600"/>
+              </a:spcAft>
+              <a:buFont typeface="Arial" panose="020B0604020202020204" pitchFamily="34" charset="0"/>
+              <a:buChar char="•"/>
+            </a:pPr>
+            <a:r>
+              <a:rPr lang="en-US" dirty="0"/>
+              <a:t>A defensive alliance is formed with the Athenians against potential Makedonian invasion.</a:t>
+            </a:r>
+            <a:endParaRPr lang="en-US" b="1" dirty="0"/>
+          </a:p>
+        </p:txBody>
+      </p:sp>
+      <p:sp>
+        <p:nvSpPr>
+          <p:cNvPr id="77" name="Rectangle 76">
+            <a:extLst>
+              <a:ext uri="{FF2B5EF4-FFF2-40B4-BE49-F238E27FC236}">
+                <a16:creationId xmlns:a16="http://schemas.microsoft.com/office/drawing/2014/main" id="{F2B38F72-8FC4-4001-8C67-FA6B86DEC767}"/>
+              </a:ext>
+              <a:ext uri="{C183D7F6-B498-43B3-948B-1728B52AA6E4}">
+                <adec:decorative xmlns:adec="http://schemas.microsoft.com/office/drawing/2017/decorative" val="1"/>
+              </a:ext>
+            </a:extLst>
+          </p:cNvPr>
+          <p:cNvSpPr>
+            <a:spLocks noGrp="1" noRot="1" noChangeAspect="1" noMove="1" noResize="1" noEditPoints="1" noAdjustHandles="1" noChangeArrowheads="1" noChangeShapeType="1" noTextEdit="1"/>
+          </p:cNvSpPr>
+          <p:nvPr>
+            <p:extLst>
+              <p:ext uri="{386F3935-93C4-4BCD-93E2-E3B085C9AB24}">
+                <p16:designElem xmlns:p16="http://schemas.microsoft.com/office/powerpoint/2015/main" val="1"/>
+              </p:ext>
+            </p:extLst>
+          </p:nvPr>
+        </p:nvSpPr>
+        <p:spPr>
+          <a:xfrm>
+            <a:off x="4636008" y="2"/>
+            <a:ext cx="7555992" cy="6857998"/>
+          </a:xfrm>
+          <a:prstGeom prst="rect">
+            <a:avLst/>
+          </a:prstGeom>
+          <a:solidFill>
+            <a:schemeClr val="tx1"/>
+          </a:solidFill>
+          <a:ln>
+            <a:noFill/>
+          </a:ln>
+        </p:spPr>
+        <p:style>
+          <a:lnRef idx="2">
+            <a:schemeClr val="accent1">
+              <a:shade val="50000"/>
+            </a:schemeClr>
+          </a:lnRef>
+          <a:fillRef idx="1">
+            <a:schemeClr val="accent1"/>
+          </a:fillRef>
+          <a:effectRef idx="0">
+            <a:schemeClr val="accent1"/>
+          </a:effectRef>
+          <a:fontRef idx="minor">
+            <a:schemeClr val="lt1"/>
+          </a:fontRef>
+        </p:style>
+        <p:txBody>
+          <a:bodyPr rtlCol="0" anchor="ctr"/>
+          <a:lstStyle/>
+          <a:p>
+            <a:pPr algn="ctr"/>
+            <a:endParaRPr lang="en-US"/>
+          </a:p>
+        </p:txBody>
+      </p:sp>
+      <p:pic>
+        <p:nvPicPr>
+          <p:cNvPr id="3" name="Picture 2">
+            <a:extLst>
+              <a:ext uri="{FF2B5EF4-FFF2-40B4-BE49-F238E27FC236}">
+                <a16:creationId xmlns:a16="http://schemas.microsoft.com/office/drawing/2014/main" id="{DF48942B-53F6-45ED-9B7A-D117C19EB58F}"/>
+              </a:ext>
+            </a:extLst>
+          </p:cNvPr>
+          <p:cNvPicPr>
+            <a:picLocks noChangeAspect="1"/>
+          </p:cNvPicPr>
+          <p:nvPr/>
+        </p:nvPicPr>
+        <p:blipFill rotWithShape="1">
+          <a:blip r:embed="rId3">
+            <a:extLst>
+              <a:ext uri="{28A0092B-C50C-407E-A947-70E740481C1C}">
+                <a14:useLocalDpi xmlns:a14="http://schemas.microsoft.com/office/drawing/2010/main" val="0"/>
+              </a:ext>
+            </a:extLst>
+          </a:blip>
+          <a:srcRect r="10364"/>
+          <a:stretch/>
+        </p:blipFill>
+        <p:spPr>
+          <a:xfrm>
+            <a:off x="5276088" y="640082"/>
+            <a:ext cx="6276250" cy="5577838"/>
+          </a:xfrm>
+          <a:prstGeom prst="rect">
+            <a:avLst/>
+          </a:prstGeom>
+          <a:effectLst/>
+        </p:spPr>
+      </p:pic>
+      <p:sp>
+        <p:nvSpPr>
+          <p:cNvPr id="5" name="TextBox 4">
+            <a:extLst>
+              <a:ext uri="{FF2B5EF4-FFF2-40B4-BE49-F238E27FC236}">
+                <a16:creationId xmlns:a16="http://schemas.microsoft.com/office/drawing/2014/main" id="{3982180C-1337-4672-90A8-C56DA1D14D58}"/>
+              </a:ext>
+            </a:extLst>
+          </p:cNvPr>
+          <p:cNvSpPr txBox="1"/>
+          <p:nvPr/>
+        </p:nvSpPr>
+        <p:spPr>
+          <a:xfrm>
+            <a:off x="88570" y="360375"/>
+            <a:ext cx="4227397" cy="1677382"/>
+          </a:xfrm>
+          <a:prstGeom prst="rect">
+            <a:avLst/>
+          </a:prstGeom>
+          <a:noFill/>
+        </p:spPr>
+        <p:txBody>
+          <a:bodyPr wrap="square" rtlCol="0">
+            <a:spAutoFit/>
+          </a:bodyPr>
+          <a:lstStyle/>
+          <a:p>
+            <a:pPr>
+              <a:spcAft>
+                <a:spcPts val="600"/>
+              </a:spcAft>
+            </a:pPr>
+            <a:r>
+              <a:rPr lang="en-US" sz="1400" dirty="0"/>
+              <a:t>*Ptolemy II lost lands in Asia Minor to the Seleukids in the Second Syrian War. He also died in 246 BCE and was succeeded by Ptolemy III Euergetes without incident.</a:t>
+            </a:r>
+          </a:p>
+          <a:p>
+            <a:pPr>
+              <a:spcAft>
+                <a:spcPts val="600"/>
+              </a:spcAft>
+            </a:pPr>
+            <a:r>
+              <a:rPr lang="en-US" sz="1400" dirty="0"/>
+              <a:t>**While Seleukos II was occupied fighting Ptolemy, his brother Antiochus </a:t>
+            </a:r>
+            <a:r>
+              <a:rPr lang="en-US" sz="1400" dirty="0" err="1"/>
+              <a:t>Hierax</a:t>
+            </a:r>
+            <a:r>
+              <a:rPr lang="en-US" sz="1400" dirty="0"/>
+              <a:t> declares himself King of Syria in 245 BCE and claims Asia Minor for himself. Seleukos II has no choice but to accept… for now.</a:t>
+            </a:r>
+          </a:p>
+        </p:txBody>
+      </p:sp>
+    </p:spTree>
+    <p:extLst>
+      <p:ext uri="{BB962C8B-B14F-4D97-AF65-F5344CB8AC3E}">
+        <p14:creationId xmlns:p14="http://schemas.microsoft.com/office/powerpoint/2010/main" val="3123724628"/>
+      </p:ext>
+    </p:extLst>
+  </p:cSld>
+  <p:clrMapOvr>
+    <a:overrideClrMapping bg1="dk1" tx1="lt1" bg2="dk2" tx2="lt2" accent1="accent1" accent2="accent2" accent3="accent3" accent4="accent4" accent5="accent5" accent6="accent6" hlink="hlink" folHlink="folHlink"/>
+  </p:clrMapOvr>
+</p:sld>
+</file>
+
+<file path=ppt/slides/slide34.xml><?xml version="1.0" encoding="utf-8"?>
+<p:sld xmlns:a="http://schemas.openxmlformats.org/drawingml/2006/main" xmlns:r="http://schemas.openxmlformats.org/officeDocument/2006/relationships" xmlns:p="http://schemas.openxmlformats.org/presentationml/2006/main">
+  <p:cSld>
+    <p:bg>
+      <p:bgPr>
+        <a:solidFill>
+          <a:schemeClr val="bg1"/>
+        </a:solidFill>
+        <a:effectLst/>
+      </p:bgPr>
+    </p:bg>
+    <p:spTree>
+      <p:nvGrpSpPr>
+        <p:cNvPr id="1" name=""/>
+        <p:cNvGrpSpPr/>
+        <p:nvPr/>
+      </p:nvGrpSpPr>
+      <p:grpSpPr>
+        <a:xfrm>
+          <a:off x="0" y="0"/>
+          <a:ext cx="0" cy="0"/>
+          <a:chOff x="0" y="0"/>
+          <a:chExt cx="0" cy="0"/>
+        </a:xfrm>
+      </p:grpSpPr>
+      <p:sp>
+        <p:nvSpPr>
+          <p:cNvPr id="4" name="TextBox 3">
+            <a:extLst>
+              <a:ext uri="{FF2B5EF4-FFF2-40B4-BE49-F238E27FC236}">
+                <a16:creationId xmlns:a16="http://schemas.microsoft.com/office/drawing/2014/main" id="{03DDB894-502D-4473-8189-C7F7050B360F}"/>
+              </a:ext>
+            </a:extLst>
+          </p:cNvPr>
+          <p:cNvSpPr txBox="1"/>
+          <p:nvPr/>
+        </p:nvSpPr>
+        <p:spPr>
+          <a:xfrm>
+            <a:off x="648931" y="640082"/>
+            <a:ext cx="3667036" cy="5577839"/>
+          </a:xfrm>
+          <a:prstGeom prst="rect">
+            <a:avLst/>
+          </a:prstGeom>
+        </p:spPr>
+        <p:txBody>
+          <a:bodyPr vert="horz" lIns="91440" tIns="45720" rIns="91440" bIns="45720" rtlCol="0">
+            <a:normAutofit/>
+          </a:bodyPr>
+          <a:lstStyle/>
+          <a:p>
+            <a:pPr defTabSz="914400">
+              <a:lnSpc>
+                <a:spcPct val="90000"/>
+              </a:lnSpc>
+              <a:spcAft>
+                <a:spcPts val="600"/>
+              </a:spcAft>
+            </a:pPr>
+            <a:r>
+              <a:rPr lang="en-US" sz="2800" b="1" dirty="0">
+                <a:latin typeface="+mj-lt"/>
+              </a:rPr>
+              <a:t>241 BCE</a:t>
+            </a:r>
+          </a:p>
+          <a:p>
+            <a:pPr marL="285750" indent="-228600" defTabSz="914400">
+              <a:lnSpc>
+                <a:spcPct val="90000"/>
+              </a:lnSpc>
+              <a:spcAft>
+                <a:spcPts val="600"/>
+              </a:spcAft>
+              <a:buFont typeface="Arial" panose="020B0604020202020204" pitchFamily="34" charset="0"/>
+              <a:buChar char="•"/>
+            </a:pPr>
+            <a:r>
+              <a:rPr lang="en-US" sz="2000" dirty="0"/>
+              <a:t>Carthage is defeated by the Roman-Syracusan alliance in the Battle of the </a:t>
+            </a:r>
+            <a:r>
+              <a:rPr lang="en-US" sz="2000" dirty="0" err="1"/>
+              <a:t>Aegates</a:t>
+            </a:r>
+            <a:r>
+              <a:rPr lang="en-US" sz="2000" dirty="0"/>
+              <a:t> Islands.</a:t>
+            </a:r>
+          </a:p>
+          <a:p>
+            <a:pPr marL="285750" indent="-228600" defTabSz="914400">
+              <a:lnSpc>
+                <a:spcPct val="90000"/>
+              </a:lnSpc>
+              <a:spcAft>
+                <a:spcPts val="600"/>
+              </a:spcAft>
+              <a:buFont typeface="Arial" panose="020B0604020202020204" pitchFamily="34" charset="0"/>
+              <a:buChar char="•"/>
+            </a:pPr>
+            <a:r>
+              <a:rPr lang="en-US" sz="2000" dirty="0"/>
+              <a:t>The First Punic War ends, Carthage renouncing all its claims on Sicily. Syracusan dominion of Sicily is confirmed.</a:t>
+            </a:r>
+          </a:p>
+          <a:p>
+            <a:pPr marL="285750" indent="-228600" defTabSz="914400">
+              <a:lnSpc>
+                <a:spcPct val="90000"/>
+              </a:lnSpc>
+              <a:spcAft>
+                <a:spcPts val="600"/>
+              </a:spcAft>
+              <a:buFont typeface="Arial" panose="020B0604020202020204" pitchFamily="34" charset="0"/>
+              <a:buChar char="•"/>
+            </a:pPr>
+            <a:r>
+              <a:rPr lang="en-US" sz="2000" dirty="0"/>
+              <a:t>An Eternal Alliance Treaty is signed between Rome and Syracuse, and a Roman legion (supported by Syracusan taxes) is stationed in Sicily.</a:t>
+            </a:r>
+            <a:endParaRPr lang="en-US" sz="2000" b="1" dirty="0"/>
+          </a:p>
+        </p:txBody>
+      </p:sp>
+      <p:sp>
+        <p:nvSpPr>
+          <p:cNvPr id="82" name="Rectangle 81">
+            <a:extLst>
+              <a:ext uri="{FF2B5EF4-FFF2-40B4-BE49-F238E27FC236}">
+                <a16:creationId xmlns:a16="http://schemas.microsoft.com/office/drawing/2014/main" id="{F2B38F72-8FC4-4001-8C67-FA6B86DEC767}"/>
+              </a:ext>
+              <a:ext uri="{C183D7F6-B498-43B3-948B-1728B52AA6E4}">
+                <adec:decorative xmlns:adec="http://schemas.microsoft.com/office/drawing/2017/decorative" val="1"/>
+              </a:ext>
+            </a:extLst>
+          </p:cNvPr>
+          <p:cNvSpPr>
+            <a:spLocks noGrp="1" noRot="1" noChangeAspect="1" noMove="1" noResize="1" noEditPoints="1" noAdjustHandles="1" noChangeArrowheads="1" noChangeShapeType="1" noTextEdit="1"/>
+          </p:cNvSpPr>
+          <p:nvPr>
+            <p:extLst>
+              <p:ext uri="{386F3935-93C4-4BCD-93E2-E3B085C9AB24}">
+                <p16:designElem xmlns:p16="http://schemas.microsoft.com/office/powerpoint/2015/main" val="1"/>
+              </p:ext>
+            </p:extLst>
+          </p:nvPr>
+        </p:nvSpPr>
+        <p:spPr>
+          <a:xfrm>
+            <a:off x="4636008" y="2"/>
+            <a:ext cx="7555992" cy="6857998"/>
+          </a:xfrm>
+          <a:prstGeom prst="rect">
+            <a:avLst/>
+          </a:prstGeom>
+          <a:solidFill>
+            <a:schemeClr val="tx1"/>
+          </a:solidFill>
+          <a:ln>
+            <a:noFill/>
+          </a:ln>
+        </p:spPr>
+        <p:style>
+          <a:lnRef idx="2">
+            <a:schemeClr val="accent1">
+              <a:shade val="50000"/>
+            </a:schemeClr>
+          </a:lnRef>
+          <a:fillRef idx="1">
+            <a:schemeClr val="accent1"/>
+          </a:fillRef>
+          <a:effectRef idx="0">
+            <a:schemeClr val="accent1"/>
+          </a:effectRef>
+          <a:fontRef idx="minor">
+            <a:schemeClr val="lt1"/>
+          </a:fontRef>
+        </p:style>
+        <p:txBody>
+          <a:bodyPr rtlCol="0" anchor="ctr"/>
+          <a:lstStyle/>
+          <a:p>
+            <a:pPr algn="ctr"/>
+            <a:endParaRPr lang="en-US"/>
+          </a:p>
+        </p:txBody>
+      </p:sp>
+      <p:pic>
+        <p:nvPicPr>
+          <p:cNvPr id="3" name="Picture 2">
+            <a:extLst>
+              <a:ext uri="{FF2B5EF4-FFF2-40B4-BE49-F238E27FC236}">
+                <a16:creationId xmlns:a16="http://schemas.microsoft.com/office/drawing/2014/main" id="{DF48942B-53F6-45ED-9B7A-D117C19EB58F}"/>
+              </a:ext>
+            </a:extLst>
+          </p:cNvPr>
+          <p:cNvPicPr>
+            <a:picLocks noChangeAspect="1"/>
+          </p:cNvPicPr>
+          <p:nvPr/>
+        </p:nvPicPr>
+        <p:blipFill rotWithShape="1">
+          <a:blip r:embed="rId3">
+            <a:extLst>
+              <a:ext uri="{28A0092B-C50C-407E-A947-70E740481C1C}">
+                <a14:useLocalDpi xmlns:a14="http://schemas.microsoft.com/office/drawing/2010/main" val="0"/>
+              </a:ext>
+            </a:extLst>
+          </a:blip>
+          <a:srcRect t="3359" r="-6" b="9986"/>
+          <a:stretch/>
+        </p:blipFill>
+        <p:spPr>
+          <a:xfrm>
+            <a:off x="5276088" y="640082"/>
+            <a:ext cx="6276250" cy="5577838"/>
+          </a:xfrm>
+          <a:prstGeom prst="rect">
+            <a:avLst/>
+          </a:prstGeom>
+          <a:effectLst/>
+        </p:spPr>
+      </p:pic>
+    </p:spTree>
+    <p:extLst>
+      <p:ext uri="{BB962C8B-B14F-4D97-AF65-F5344CB8AC3E}">
+        <p14:creationId xmlns:p14="http://schemas.microsoft.com/office/powerpoint/2010/main" val="2331425598"/>
+      </p:ext>
+    </p:extLst>
+  </p:cSld>
+  <p:clrMapOvr>
+    <a:overrideClrMapping bg1="dk1" tx1="lt1" bg2="dk2" tx2="lt2" accent1="accent1" accent2="accent2" accent3="accent3" accent4="accent4" accent5="accent5" accent6="accent6" hlink="hlink" folHlink="folHlink"/>
+  </p:clrMapOvr>
+</p:sld>
+</file>
+
+<file path=ppt/slides/slide35.xml><?xml version="1.0" encoding="utf-8"?>
+<p:sld xmlns:a="http://schemas.openxmlformats.org/drawingml/2006/main" xmlns:r="http://schemas.openxmlformats.org/officeDocument/2006/relationships" xmlns:p="http://schemas.openxmlformats.org/presentationml/2006/main">
+  <p:cSld>
+    <p:bg>
+      <p:bgPr>
+        <a:solidFill>
+          <a:schemeClr val="bg1"/>
+        </a:solidFill>
+        <a:effectLst/>
+      </p:bgPr>
+    </p:bg>
+    <p:spTree>
+      <p:nvGrpSpPr>
+        <p:cNvPr id="1" name=""/>
+        <p:cNvGrpSpPr/>
+        <p:nvPr/>
+      </p:nvGrpSpPr>
+      <p:grpSpPr>
+        <a:xfrm>
+          <a:off x="0" y="0"/>
+          <a:ext cx="0" cy="0"/>
+          <a:chOff x="0" y="0"/>
+          <a:chExt cx="0" cy="0"/>
+        </a:xfrm>
+      </p:grpSpPr>
       <p:sp useBgFill="1">
         <p:nvSpPr>
-          <p:cNvPr id="70" name="Rectangle 69">
+          <p:cNvPr id="77" name="Rectangle 76">
+            <a:extLst>
+              <a:ext uri="{FF2B5EF4-FFF2-40B4-BE49-F238E27FC236}">
+                <a16:creationId xmlns:a16="http://schemas.microsoft.com/office/drawing/2014/main" id="{3AFE8227-C443-417B-BA91-520EB1EF4559}"/>
+              </a:ext>
+              <a:ext uri="{C183D7F6-B498-43B3-948B-1728B52AA6E4}">
+                <adec:decorative xmlns:adec="http://schemas.microsoft.com/office/drawing/2017/decorative" val="1"/>
+              </a:ext>
+            </a:extLst>
+          </p:cNvPr>
+          <p:cNvSpPr>
+            <a:spLocks noGrp="1" noRot="1" noChangeAspect="1" noMove="1" noResize="1" noEditPoints="1" noAdjustHandles="1" noChangeArrowheads="1" noChangeShapeType="1" noTextEdit="1"/>
+          </p:cNvSpPr>
+          <p:nvPr>
+            <p:extLst>
+              <p:ext uri="{386F3935-93C4-4BCD-93E2-E3B085C9AB24}">
+                <p16:designElem xmlns:p16="http://schemas.microsoft.com/office/powerpoint/2015/main" val="1"/>
+              </p:ext>
+            </p:extLst>
+          </p:nvPr>
+        </p:nvSpPr>
+        <p:spPr>
+          <a:xfrm>
+            <a:off x="0" y="2"/>
+            <a:ext cx="12192000" cy="6857997"/>
+          </a:xfrm>
+          <a:prstGeom prst="rect">
+            <a:avLst/>
+          </a:prstGeom>
+          <a:ln>
+            <a:noFill/>
+          </a:ln>
+        </p:spPr>
+        <p:style>
+          <a:lnRef idx="2">
+            <a:schemeClr val="accent1">
+              <a:shade val="50000"/>
+            </a:schemeClr>
+          </a:lnRef>
+          <a:fillRef idx="1">
+            <a:schemeClr val="accent1"/>
+          </a:fillRef>
+          <a:effectRef idx="0">
+            <a:schemeClr val="accent1"/>
+          </a:effectRef>
+          <a:fontRef idx="minor">
+            <a:schemeClr val="lt1"/>
+          </a:fontRef>
+        </p:style>
+        <p:txBody>
+          <a:bodyPr rtlCol="0" anchor="ctr"/>
+          <a:lstStyle/>
+          <a:p>
+            <a:pPr algn="ctr"/>
+            <a:endParaRPr lang="en-US"/>
+          </a:p>
+        </p:txBody>
+      </p:sp>
+      <p:pic>
+        <p:nvPicPr>
+          <p:cNvPr id="3" name="Picture 2">
+            <a:extLst>
+              <a:ext uri="{FF2B5EF4-FFF2-40B4-BE49-F238E27FC236}">
+                <a16:creationId xmlns:a16="http://schemas.microsoft.com/office/drawing/2014/main" id="{DF48942B-53F6-45ED-9B7A-D117C19EB58F}"/>
+              </a:ext>
+            </a:extLst>
+          </p:cNvPr>
+          <p:cNvPicPr>
+            <a:picLocks noChangeAspect="1"/>
+          </p:cNvPicPr>
+          <p:nvPr/>
+        </p:nvPicPr>
+        <p:blipFill rotWithShape="1">
+          <a:blip r:embed="rId3">
+            <a:extLst>
+              <a:ext uri="{28A0092B-C50C-407E-A947-70E740481C1C}">
+                <a14:useLocalDpi xmlns:a14="http://schemas.microsoft.com/office/drawing/2010/main" val="0"/>
+              </a:ext>
+            </a:extLst>
+          </a:blip>
+          <a:srcRect l="7112" r="7112"/>
+          <a:stretch/>
+        </p:blipFill>
+        <p:spPr>
+          <a:xfrm>
+            <a:off x="20" y="431"/>
+            <a:ext cx="8115280" cy="6408311"/>
+          </a:xfrm>
+          <a:prstGeom prst="rect">
+            <a:avLst/>
+          </a:prstGeom>
+        </p:spPr>
+      </p:pic>
+      <p:sp>
+        <p:nvSpPr>
+          <p:cNvPr id="4" name="TextBox 3">
+            <a:extLst>
+              <a:ext uri="{FF2B5EF4-FFF2-40B4-BE49-F238E27FC236}">
+                <a16:creationId xmlns:a16="http://schemas.microsoft.com/office/drawing/2014/main" id="{03DDB894-502D-4473-8189-C7F7050B360F}"/>
+              </a:ext>
+            </a:extLst>
+          </p:cNvPr>
+          <p:cNvSpPr txBox="1"/>
+          <p:nvPr/>
+        </p:nvSpPr>
+        <p:spPr>
+          <a:xfrm>
+            <a:off x="8682242" y="301932"/>
+            <a:ext cx="2942813" cy="4136504"/>
+          </a:xfrm>
+          <a:prstGeom prst="rect">
+            <a:avLst/>
+          </a:prstGeom>
+        </p:spPr>
+        <p:txBody>
+          <a:bodyPr vert="horz" lIns="91440" tIns="45720" rIns="91440" bIns="45720" rtlCol="0">
+            <a:normAutofit/>
+          </a:bodyPr>
+          <a:lstStyle/>
+          <a:p>
+            <a:pPr defTabSz="914400">
+              <a:lnSpc>
+                <a:spcPct val="90000"/>
+              </a:lnSpc>
+              <a:spcAft>
+                <a:spcPts val="600"/>
+              </a:spcAft>
+            </a:pPr>
+            <a:r>
+              <a:rPr lang="en-US" sz="3200" b="1" dirty="0">
+                <a:latin typeface="+mj-lt"/>
+              </a:rPr>
+              <a:t>237 BCE</a:t>
+            </a:r>
+          </a:p>
+          <a:p>
+            <a:pPr marL="285750" indent="-228600" defTabSz="914400">
+              <a:lnSpc>
+                <a:spcPct val="90000"/>
+              </a:lnSpc>
+              <a:spcAft>
+                <a:spcPts val="600"/>
+              </a:spcAft>
+              <a:buFont typeface="Arial" panose="020B0604020202020204" pitchFamily="34" charset="0"/>
+              <a:buChar char="•"/>
+            </a:pPr>
+            <a:r>
+              <a:rPr lang="en-US" sz="2000" dirty="0"/>
+              <a:t>The </a:t>
+            </a:r>
+            <a:r>
+              <a:rPr lang="en-US" sz="2000" dirty="0" err="1"/>
+              <a:t>Parni</a:t>
+            </a:r>
+            <a:r>
+              <a:rPr lang="en-US" sz="2000" dirty="0"/>
+              <a:t> King Arsaces invades and conquers the Seleukid Satrapy of Parthia.</a:t>
+            </a:r>
+          </a:p>
+          <a:p>
+            <a:pPr marL="285750" indent="-228600" defTabSz="914400">
+              <a:lnSpc>
+                <a:spcPct val="90000"/>
+              </a:lnSpc>
+              <a:spcAft>
+                <a:spcPts val="600"/>
+              </a:spcAft>
+              <a:buFont typeface="Arial" panose="020B0604020202020204" pitchFamily="34" charset="0"/>
+              <a:buChar char="•"/>
+            </a:pPr>
+            <a:r>
+              <a:rPr lang="en-US" sz="2000" dirty="0"/>
+              <a:t>Seleukos II </a:t>
+            </a:r>
+            <a:r>
+              <a:rPr lang="en-US" sz="2000" dirty="0" err="1"/>
+              <a:t>Callinicus</a:t>
+            </a:r>
+            <a:r>
+              <a:rPr lang="en-US" sz="2000" dirty="0"/>
+              <a:t> is taken prisoner.</a:t>
+            </a:r>
+            <a:endParaRPr lang="en-US" sz="2000" b="1" dirty="0"/>
+          </a:p>
+        </p:txBody>
+      </p:sp>
+      <p:sp>
+        <p:nvSpPr>
+          <p:cNvPr id="79" name="Rectangle 78">
+            <a:extLst>
+              <a:ext uri="{FF2B5EF4-FFF2-40B4-BE49-F238E27FC236}">
+                <a16:creationId xmlns:a16="http://schemas.microsoft.com/office/drawing/2014/main" id="{907741FC-B544-4A6E-B831-6789D042333D}"/>
+              </a:ext>
+              <a:ext uri="{C183D7F6-B498-43B3-948B-1728B52AA6E4}">
+                <adec:decorative xmlns:adec="http://schemas.microsoft.com/office/drawing/2017/decorative" val="1"/>
+              </a:ext>
+            </a:extLst>
+          </p:cNvPr>
+          <p:cNvSpPr>
+            <a:spLocks noGrp="1" noRot="1" noChangeAspect="1" noMove="1" noResize="1" noEditPoints="1" noAdjustHandles="1" noChangeArrowheads="1" noChangeShapeType="1" noTextEdit="1"/>
+          </p:cNvSpPr>
+          <p:nvPr>
+            <p:extLst>
+              <p:ext uri="{386F3935-93C4-4BCD-93E2-E3B085C9AB24}">
+                <p16:designElem xmlns:p16="http://schemas.microsoft.com/office/powerpoint/2015/main" val="1"/>
+              </p:ext>
+            </p:extLst>
+          </p:nvPr>
+        </p:nvSpPr>
+        <p:spPr>
+          <a:xfrm flipH="1">
+            <a:off x="-1" y="6408741"/>
+            <a:ext cx="12191998" cy="457202"/>
+          </a:xfrm>
+          <a:prstGeom prst="rect">
+            <a:avLst/>
+          </a:prstGeom>
+          <a:gradFill>
+            <a:gsLst>
+              <a:gs pos="34000">
+                <a:srgbClr val="000000">
+                  <a:alpha val="96000"/>
+                </a:srgbClr>
+              </a:gs>
+              <a:gs pos="100000">
+                <a:schemeClr val="accent1"/>
+              </a:gs>
+            </a:gsLst>
+            <a:lin ang="8400000" scaled="0"/>
+          </a:gradFill>
+          <a:ln>
+            <a:noFill/>
+          </a:ln>
+        </p:spPr>
+        <p:style>
+          <a:lnRef idx="2">
+            <a:schemeClr val="accent1">
+              <a:shade val="50000"/>
+            </a:schemeClr>
+          </a:lnRef>
+          <a:fillRef idx="1">
+            <a:schemeClr val="accent1"/>
+          </a:fillRef>
+          <a:effectRef idx="0">
+            <a:schemeClr val="accent1"/>
+          </a:effectRef>
+          <a:fontRef idx="minor">
+            <a:schemeClr val="lt1"/>
+          </a:fontRef>
+        </p:style>
+        <p:txBody>
+          <a:bodyPr rtlCol="0" anchor="ctr"/>
+          <a:lstStyle/>
+          <a:p>
+            <a:pPr algn="ctr"/>
+            <a:endParaRPr lang="en-US"/>
+          </a:p>
+        </p:txBody>
+      </p:sp>
+      <p:sp>
+        <p:nvSpPr>
+          <p:cNvPr id="81" name="Rectangle 80">
+            <a:extLst>
+              <a:ext uri="{FF2B5EF4-FFF2-40B4-BE49-F238E27FC236}">
+                <a16:creationId xmlns:a16="http://schemas.microsoft.com/office/drawing/2014/main" id="{3F0BE7ED-7814-4273-B18A-F26CC0380380}"/>
+              </a:ext>
+              <a:ext uri="{C183D7F6-B498-43B3-948B-1728B52AA6E4}">
+                <adec:decorative xmlns:adec="http://schemas.microsoft.com/office/drawing/2017/decorative" val="1"/>
+              </a:ext>
+            </a:extLst>
+          </p:cNvPr>
+          <p:cNvSpPr>
+            <a:spLocks noGrp="1" noRot="1" noChangeAspect="1" noMove="1" noResize="1" noEditPoints="1" noAdjustHandles="1" noChangeArrowheads="1" noChangeShapeType="1" noTextEdit="1"/>
+          </p:cNvSpPr>
+          <p:nvPr>
+            <p:extLst>
+              <p:ext uri="{386F3935-93C4-4BCD-93E2-E3B085C9AB24}">
+                <p16:designElem xmlns:p16="http://schemas.microsoft.com/office/powerpoint/2015/main" val="1"/>
+              </p:ext>
+            </p:extLst>
+          </p:nvPr>
+        </p:nvSpPr>
+        <p:spPr>
+          <a:xfrm flipH="1">
+            <a:off x="-4" y="6408742"/>
+            <a:ext cx="8115300" cy="449258"/>
+          </a:xfrm>
+          <a:prstGeom prst="rect">
+            <a:avLst/>
+          </a:prstGeom>
+          <a:gradFill>
+            <a:gsLst>
+              <a:gs pos="28000">
+                <a:schemeClr val="accent1">
+                  <a:lumMod val="75000"/>
+                  <a:alpha val="59000"/>
+                </a:schemeClr>
+              </a:gs>
+              <a:gs pos="100000">
+                <a:srgbClr val="000000">
+                  <a:alpha val="70000"/>
+                </a:srgbClr>
+              </a:gs>
+            </a:gsLst>
+            <a:lin ang="11400000" scaled="0"/>
+          </a:gradFill>
+          <a:ln>
+            <a:noFill/>
+          </a:ln>
+        </p:spPr>
+        <p:style>
+          <a:lnRef idx="2">
+            <a:schemeClr val="accent1">
+              <a:shade val="50000"/>
+            </a:schemeClr>
+          </a:lnRef>
+          <a:fillRef idx="1">
+            <a:schemeClr val="accent1"/>
+          </a:fillRef>
+          <a:effectRef idx="0">
+            <a:schemeClr val="accent1"/>
+          </a:effectRef>
+          <a:fontRef idx="minor">
+            <a:schemeClr val="lt1"/>
+          </a:fontRef>
+        </p:style>
+        <p:txBody>
+          <a:bodyPr rtlCol="0" anchor="ctr"/>
+          <a:lstStyle/>
+          <a:p>
+            <a:pPr algn="ctr"/>
+            <a:endParaRPr lang="en-US"/>
+          </a:p>
+        </p:txBody>
+      </p:sp>
+      <p:sp>
+        <p:nvSpPr>
+          <p:cNvPr id="2" name="TextBox 1">
+            <a:extLst>
+              <a:ext uri="{FF2B5EF4-FFF2-40B4-BE49-F238E27FC236}">
+                <a16:creationId xmlns:a16="http://schemas.microsoft.com/office/drawing/2014/main" id="{B4300520-0834-4B66-8C44-541E4356DA46}"/>
+              </a:ext>
+            </a:extLst>
+          </p:cNvPr>
+          <p:cNvSpPr txBox="1"/>
+          <p:nvPr/>
+        </p:nvSpPr>
+        <p:spPr>
+          <a:xfrm>
+            <a:off x="8486454" y="4457343"/>
+            <a:ext cx="3138601" cy="1600438"/>
+          </a:xfrm>
+          <a:prstGeom prst="rect">
+            <a:avLst/>
+          </a:prstGeom>
+          <a:noFill/>
+        </p:spPr>
+        <p:txBody>
+          <a:bodyPr wrap="square" rtlCol="0">
+            <a:spAutoFit/>
+          </a:bodyPr>
+          <a:lstStyle/>
+          <a:p>
+            <a:r>
+              <a:rPr lang="en-US" sz="1400" dirty="0"/>
+              <a:t>*It also stands to mention that </a:t>
+            </a:r>
+            <a:r>
+              <a:rPr lang="en-US" sz="1400" dirty="0" err="1"/>
+              <a:t>Ptolemaioi</a:t>
+            </a:r>
+            <a:r>
+              <a:rPr lang="en-US" sz="1400" dirty="0"/>
+              <a:t> made gains against the Seleukids in the Third Syrian War, retaining </a:t>
+            </a:r>
+            <a:r>
+              <a:rPr lang="en-US" sz="1400" dirty="0" err="1"/>
+              <a:t>Ephesos</a:t>
+            </a:r>
+            <a:r>
+              <a:rPr lang="en-US" sz="1400" dirty="0"/>
+              <a:t> and </a:t>
+            </a:r>
+            <a:r>
+              <a:rPr lang="en-US" sz="1400" dirty="0" err="1"/>
+              <a:t>Seleukeia</a:t>
+            </a:r>
+            <a:r>
+              <a:rPr lang="en-US" sz="1400" dirty="0"/>
+              <a:t> Pieria near </a:t>
+            </a:r>
+            <a:r>
+              <a:rPr lang="en-US" sz="1400" dirty="0" err="1"/>
+              <a:t>Antiocheia</a:t>
+            </a:r>
+            <a:r>
+              <a:rPr lang="en-US" sz="1400" dirty="0"/>
+              <a:t>. This will ultimately be the main cause of the Fourth Syrian War in 219 BCE.</a:t>
+            </a:r>
+          </a:p>
+        </p:txBody>
+      </p:sp>
+    </p:spTree>
+    <p:extLst>
+      <p:ext uri="{BB962C8B-B14F-4D97-AF65-F5344CB8AC3E}">
+        <p14:creationId xmlns:p14="http://schemas.microsoft.com/office/powerpoint/2010/main" val="370924517"/>
+      </p:ext>
+    </p:extLst>
+  </p:cSld>
+  <p:clrMapOvr>
+    <a:masterClrMapping/>
+  </p:clrMapOvr>
+</p:sld>
+</file>
+
+<file path=ppt/slides/slide36.xml><?xml version="1.0" encoding="utf-8"?>
+<p:sld xmlns:a="http://schemas.openxmlformats.org/drawingml/2006/main" xmlns:r="http://schemas.openxmlformats.org/officeDocument/2006/relationships" xmlns:p="http://schemas.openxmlformats.org/presentationml/2006/main">
+  <p:cSld>
+    <p:bg>
+      <p:bgPr>
+        <a:solidFill>
+          <a:schemeClr val="bg1"/>
+        </a:solidFill>
+        <a:effectLst/>
+      </p:bgPr>
+    </p:bg>
+    <p:spTree>
+      <p:nvGrpSpPr>
+        <p:cNvPr id="1" name=""/>
+        <p:cNvGrpSpPr/>
+        <p:nvPr/>
+      </p:nvGrpSpPr>
+      <p:grpSpPr>
+        <a:xfrm>
+          <a:off x="0" y="0"/>
+          <a:ext cx="0" cy="0"/>
+          <a:chOff x="0" y="0"/>
+          <a:chExt cx="0" cy="0"/>
+        </a:xfrm>
+      </p:grpSpPr>
+      <p:sp useBgFill="1">
+        <p:nvSpPr>
+          <p:cNvPr id="86" name="Rectangle 85">
             <a:extLst>
               <a:ext uri="{FF2B5EF4-FFF2-40B4-BE49-F238E27FC236}">
                 <a16:creationId xmlns:a16="http://schemas.microsoft.com/office/drawing/2014/main" id="{F13C74B1-5B17-4795-BED0-7140497B445A}"/>
@@ -20920,7 +22339,7 @@
       </p:sp>
       <p:sp>
         <p:nvSpPr>
-          <p:cNvPr id="72" name="sketchy line">
+          <p:cNvPr id="91" name="sketchy line">
             <a:extLst>
               <a:ext uri="{FF2B5EF4-FFF2-40B4-BE49-F238E27FC236}">
                 <a16:creationId xmlns:a16="http://schemas.microsoft.com/office/drawing/2014/main" id="{D4974D33-8DC5-464E-8C6D-BE58F0669C17}"/>
@@ -21224,7 +22643,7 @@
         </p:spPr>
         <p:txBody>
           <a:bodyPr vert="horz" lIns="91440" tIns="45720" rIns="91440" bIns="45720" rtlCol="0">
-            <a:normAutofit/>
+            <a:normAutofit fontScale="92500" lnSpcReduction="10000"/>
           </a:bodyPr>
           <a:lstStyle/>
           <a:p>
@@ -21237,10 +22656,10 @@
               </a:spcAft>
             </a:pPr>
             <a:r>
-              <a:rPr lang="en-US" sz="2400" b="1" dirty="0">
+              <a:rPr lang="en-US" sz="3000" b="1" dirty="0">
                 <a:latin typeface="+mj-lt"/>
               </a:rPr>
-              <a:t>243 BCE</a:t>
+              <a:t>232 BCE</a:t>
             </a:r>
           </a:p>
           <a:p>
@@ -21255,24 +22674,8 @@
               <a:buChar char="•"/>
             </a:pPr>
             <a:r>
-              <a:rPr lang="en-US" sz="2000" dirty="0"/>
-              <a:t>Agis IV reforms the Spartan state under a new </a:t>
-            </a:r>
-            <a:r>
-              <a:rPr lang="en-US" sz="2000" dirty="0" err="1"/>
-              <a:t>Lycurgan</a:t>
-            </a:r>
-            <a:r>
-              <a:rPr lang="en-US" sz="2000" dirty="0"/>
-              <a:t> model. The entire Peloponnesus is turned into a militaristic state, with all </a:t>
-            </a:r>
-            <a:r>
-              <a:rPr lang="en-US" sz="2000" dirty="0" err="1"/>
-              <a:t>Hellens</a:t>
-            </a:r>
-            <a:r>
-              <a:rPr lang="en-US" sz="2000" dirty="0"/>
-              <a:t> gaining citizenship and with all young men being enrolled into the new Agoge system.</a:t>
+              <a:rPr lang="en-US" sz="2400" b="1" dirty="0"/>
+              <a:t>Ashoka the Great is ambushed by Hindu fanatics and drowned in the Ganges River.</a:t>
             </a:r>
           </a:p>
           <a:p>
@@ -21287,10 +22690,9 @@
               <a:buChar char="•"/>
             </a:pPr>
             <a:r>
-              <a:rPr lang="en-US" sz="2000" dirty="0"/>
-              <a:t>A defensive alliance is formed with the Athenians against potential Makedonian invasion.</a:t>
-            </a:r>
-            <a:endParaRPr lang="en-US" sz="2000" b="1" dirty="0"/>
+              <a:rPr lang="en-US" sz="2400" b="1" dirty="0"/>
+              <a:t>The empire falls into chaos as several kings in central and southern India and all the Hellenic satraps in Sindhia declare independence. His son and heir Dasharatha struggles to restore order.</a:t>
+            </a:r>
           </a:p>
         </p:txBody>
       </p:sp>
@@ -21316,7 +22718,7 @@
               </a:ext>
             </a:extLst>
           </a:blip>
-          <a:srcRect r="16745" b="3"/>
+          <a:srcRect r="11232" b="1"/>
           <a:stretch/>
         </p:blipFill>
         <p:spPr>
@@ -21441,50 +22843,10 @@
           </a:custGeom>
         </p:spPr>
       </p:pic>
-      <p:sp>
-        <p:nvSpPr>
-          <p:cNvPr id="5" name="TextBox 4">
-            <a:extLst>
-              <a:ext uri="{FF2B5EF4-FFF2-40B4-BE49-F238E27FC236}">
-                <a16:creationId xmlns:a16="http://schemas.microsoft.com/office/drawing/2014/main" id="{3982180C-1337-4672-90A8-C56DA1D14D58}"/>
-              </a:ext>
-            </a:extLst>
-          </p:cNvPr>
-          <p:cNvSpPr txBox="1"/>
-          <p:nvPr/>
-        </p:nvSpPr>
-        <p:spPr>
-          <a:xfrm>
-            <a:off x="261973" y="504214"/>
-            <a:ext cx="4787757" cy="738664"/>
-          </a:xfrm>
-          <a:prstGeom prst="rect">
-            <a:avLst/>
-          </a:prstGeom>
-          <a:noFill/>
-        </p:spPr>
-        <p:txBody>
-          <a:bodyPr wrap="square" rtlCol="0">
-            <a:spAutoFit/>
-          </a:bodyPr>
-          <a:lstStyle/>
-          <a:p>
-            <a:pPr>
-              <a:spcAft>
-                <a:spcPts val="600"/>
-              </a:spcAft>
-            </a:pPr>
-            <a:r>
-              <a:rPr lang="en-US" sz="1400" dirty="0"/>
-              <a:t>*Ptolemy II lost lands in Asia Minor to the Seleukids in the Second Syrian War. He also died in 246 BCE and was succeeded by Ptolemy III Euergetes without incident.</a:t>
-            </a:r>
-          </a:p>
-        </p:txBody>
-      </p:sp>
     </p:spTree>
     <p:extLst>
       <p:ext uri="{BB962C8B-B14F-4D97-AF65-F5344CB8AC3E}">
-        <p14:creationId xmlns:p14="http://schemas.microsoft.com/office/powerpoint/2010/main" val="3123724628"/>
+        <p14:creationId xmlns:p14="http://schemas.microsoft.com/office/powerpoint/2010/main" val="2404304302"/>
       </p:ext>
     </p:extLst>
   </p:cSld>
@@ -21494,7 +22856,7 @@
 </p:sld>
 </file>
 
-<file path=ppt/slides/slide34.xml><?xml version="1.0" encoding="utf-8"?>
+<file path=ppt/slides/slide37.xml><?xml version="1.0" encoding="utf-8"?>
 <p:sld xmlns:a="http://schemas.openxmlformats.org/drawingml/2006/main" xmlns:r="http://schemas.openxmlformats.org/officeDocument/2006/relationships" xmlns:p="http://schemas.openxmlformats.org/presentationml/2006/main">
   <p:cSld>
     <p:bg>
@@ -21521,10 +22883,10 @@
       </p:grpSpPr>
       <p:sp useBgFill="1">
         <p:nvSpPr>
-          <p:cNvPr id="77" name="Rectangle 76">
+          <p:cNvPr id="96" name="Rectangle 95">
             <a:extLst>
               <a:ext uri="{FF2B5EF4-FFF2-40B4-BE49-F238E27FC236}">
-                <a16:creationId xmlns:a16="http://schemas.microsoft.com/office/drawing/2014/main" id="{3AFE8227-C443-417B-BA91-520EB1EF4559}"/>
+                <a16:creationId xmlns:a16="http://schemas.microsoft.com/office/drawing/2014/main" id="{E36BB3C5-822B-45E1-A81E-5CC3176C61A1}"/>
               </a:ext>
               <a:ext uri="{C183D7F6-B498-43B3-948B-1728B52AA6E4}">
                 <adec:decorative xmlns:adec="http://schemas.microsoft.com/office/drawing/2017/decorative" val="1"/>
@@ -21544,8 +22906,8 @@
         </p:nvSpPr>
         <p:spPr>
           <a:xfrm>
-            <a:off x="0" y="2"/>
-            <a:ext cx="12192000" cy="6857997"/>
+            <a:off x="0" y="0"/>
+            <a:ext cx="12192000" cy="6858000"/>
           </a:xfrm>
           <a:prstGeom prst="rect">
             <a:avLst/>
@@ -21581,10 +22943,10 @@
       </p:sp>
       <p:pic>
         <p:nvPicPr>
-          <p:cNvPr id="3" name="Picture 2">
+          <p:cNvPr id="6" name="Picture 5">
             <a:extLst>
               <a:ext uri="{FF2B5EF4-FFF2-40B4-BE49-F238E27FC236}">
-                <a16:creationId xmlns:a16="http://schemas.microsoft.com/office/drawing/2014/main" id="{DF48942B-53F6-45ED-9B7A-D117C19EB58F}"/>
+                <a16:creationId xmlns:a16="http://schemas.microsoft.com/office/drawing/2014/main" id="{49AD5D7C-48BD-447B-BC06-60739105A938}"/>
               </a:ext>
             </a:extLst>
           </p:cNvPr>
@@ -21601,118 +22963,25 @@
               </a:ext>
             </a:extLst>
           </a:blip>
-          <a:srcRect l="6785" r="6787" b="1"/>
+          <a:srcRect t="20554" b="20554"/>
           <a:stretch/>
         </p:blipFill>
         <p:spPr>
           <a:xfrm>
-            <a:off x="20" y="431"/>
-            <a:ext cx="8115280" cy="6408311"/>
+            <a:off x="579264" y="365141"/>
+            <a:ext cx="6288262" cy="3063875"/>
           </a:xfrm>
           <a:prstGeom prst="rect">
             <a:avLst/>
           </a:prstGeom>
         </p:spPr>
       </p:pic>
-      <p:sp>
+      <p:sp useBgFill="1">
         <p:nvSpPr>
-          <p:cNvPr id="4" name="TextBox 3">
+          <p:cNvPr id="98" name="Rectangle 97">
             <a:extLst>
               <a:ext uri="{FF2B5EF4-FFF2-40B4-BE49-F238E27FC236}">
-                <a16:creationId xmlns:a16="http://schemas.microsoft.com/office/drawing/2014/main" id="{03DDB894-502D-4473-8189-C7F7050B360F}"/>
-              </a:ext>
-            </a:extLst>
-          </p:cNvPr>
-          <p:cNvSpPr txBox="1"/>
-          <p:nvPr/>
-        </p:nvSpPr>
-        <p:spPr>
-          <a:xfrm>
-            <a:off x="8682242" y="301932"/>
-            <a:ext cx="2942813" cy="4136504"/>
-          </a:xfrm>
-          <a:prstGeom prst="rect">
-            <a:avLst/>
-          </a:prstGeom>
-        </p:spPr>
-        <p:txBody>
-          <a:bodyPr vert="horz" lIns="91440" tIns="45720" rIns="91440" bIns="45720" rtlCol="0">
-            <a:normAutofit/>
-          </a:bodyPr>
-          <a:lstStyle/>
-          <a:p>
-            <a:pPr defTabSz="914400">
-              <a:lnSpc>
-                <a:spcPct val="90000"/>
-              </a:lnSpc>
-              <a:spcAft>
-                <a:spcPts val="600"/>
-              </a:spcAft>
-            </a:pPr>
-            <a:r>
-              <a:rPr lang="en-US" sz="3200" b="1" dirty="0">
-                <a:latin typeface="+mj-lt"/>
-              </a:rPr>
-              <a:t>237 BCE</a:t>
-            </a:r>
-          </a:p>
-          <a:p>
-            <a:pPr marL="285750" indent="-228600" defTabSz="914400">
-              <a:lnSpc>
-                <a:spcPct val="90000"/>
-              </a:lnSpc>
-              <a:spcAft>
-                <a:spcPts val="600"/>
-              </a:spcAft>
-              <a:buFont typeface="Arial" panose="020B0604020202020204" pitchFamily="34" charset="0"/>
-              <a:buChar char="•"/>
-            </a:pPr>
-            <a:r>
-              <a:rPr lang="en-US" sz="2400" dirty="0"/>
-              <a:t>The </a:t>
-            </a:r>
-            <a:r>
-              <a:rPr lang="en-US" sz="2400" dirty="0" err="1"/>
-              <a:t>Parni</a:t>
-            </a:r>
-            <a:r>
-              <a:rPr lang="en-US" sz="2400" dirty="0"/>
-              <a:t> King Arsaces invades and conquers the Seleukid Satrapy of Parthia.</a:t>
-            </a:r>
-          </a:p>
-          <a:p>
-            <a:pPr marL="285750" indent="-228600" defTabSz="914400">
-              <a:lnSpc>
-                <a:spcPct val="90000"/>
-              </a:lnSpc>
-              <a:spcAft>
-                <a:spcPts val="600"/>
-              </a:spcAft>
-              <a:buFont typeface="Arial" panose="020B0604020202020204" pitchFamily="34" charset="0"/>
-              <a:buChar char="•"/>
-            </a:pPr>
-            <a:r>
-              <a:rPr lang="en-US" sz="2400" dirty="0"/>
-              <a:t>Seleukos II </a:t>
-            </a:r>
-            <a:r>
-              <a:rPr lang="en-US" sz="2400" dirty="0" err="1"/>
-              <a:t>Callinicus</a:t>
-            </a:r>
-            <a:r>
-              <a:rPr lang="en-US" sz="2400" dirty="0"/>
-              <a:t> is taken prisoner.</a:t>
-            </a:r>
-            <a:endParaRPr lang="en-US" sz="2400" b="1" dirty="0"/>
-          </a:p>
-        </p:txBody>
-      </p:sp>
-      <p:sp>
-        <p:nvSpPr>
-          <p:cNvPr id="79" name="Rectangle 78">
-            <a:extLst>
-              <a:ext uri="{FF2B5EF4-FFF2-40B4-BE49-F238E27FC236}">
-                <a16:creationId xmlns:a16="http://schemas.microsoft.com/office/drawing/2014/main" id="{907741FC-B544-4A6E-B831-6789D042333D}"/>
+                <a16:creationId xmlns:a16="http://schemas.microsoft.com/office/drawing/2014/main" id="{FB39ECA9-4CDE-4883-98E8-287E905E9F07}"/>
               </a:ext>
               <a:ext uri="{C183D7F6-B498-43B3-948B-1728B52AA6E4}">
                 <adec:decorative xmlns:adec="http://schemas.microsoft.com/office/drawing/2017/decorative" val="1"/>
@@ -21731,26 +23000,115 @@
           </p:nvPr>
         </p:nvSpPr>
         <p:spPr>
-          <a:xfrm flipH="1">
-            <a:off x="-1" y="6408741"/>
-            <a:ext cx="12191998" cy="457202"/>
+          <a:xfrm>
+            <a:off x="579263" y="3630934"/>
+            <a:ext cx="6288261" cy="2546028"/>
           </a:xfrm>
           <a:prstGeom prst="rect">
             <a:avLst/>
           </a:prstGeom>
-          <a:gradFill>
-            <a:gsLst>
-              <a:gs pos="34000">
-                <a:srgbClr val="000000">
-                  <a:alpha val="96000"/>
-                </a:srgbClr>
-              </a:gs>
-              <a:gs pos="100000">
-                <a:schemeClr val="accent1"/>
-              </a:gs>
-            </a:gsLst>
-            <a:lin ang="8400000" scaled="0"/>
-          </a:gradFill>
+          <a:ln w="12700">
+            <a:solidFill>
+              <a:srgbClr val="DEDEDE"/>
+            </a:solidFill>
+          </a:ln>
+          <a:effectLst>
+            <a:outerShdw blurRad="50800" dist="38100" dir="2700000" algn="tl" rotWithShape="0">
+              <a:schemeClr val="bg2">
+                <a:lumMod val="85000"/>
+                <a:alpha val="50000"/>
+              </a:schemeClr>
+            </a:outerShdw>
+          </a:effectLst>
+        </p:spPr>
+        <p:style>
+          <a:lnRef idx="2">
+            <a:schemeClr val="accent1">
+              <a:shade val="50000"/>
+            </a:schemeClr>
+          </a:lnRef>
+          <a:fillRef idx="1">
+            <a:schemeClr val="accent1"/>
+          </a:fillRef>
+          <a:effectRef idx="0">
+            <a:schemeClr val="accent1"/>
+          </a:effectRef>
+          <a:fontRef idx="minor">
+            <a:schemeClr val="lt1"/>
+          </a:fontRef>
+        </p:style>
+        <p:txBody>
+          <a:bodyPr rtlCol="0" anchor="ctr"/>
+          <a:lstStyle/>
+          <a:p>
+            <a:pPr marL="0" marR="0" lvl="0" indent="0" algn="ctr" defTabSz="914400" rtl="0" eaLnBrk="1" fontAlgn="auto" latinLnBrk="0" hangingPunct="1">
+              <a:lnSpc>
+                <a:spcPct val="100000"/>
+              </a:lnSpc>
+              <a:spcBef>
+                <a:spcPts val="0"/>
+              </a:spcBef>
+              <a:spcAft>
+                <a:spcPts val="0"/>
+              </a:spcAft>
+              <a:buClrTx/>
+              <a:buSzTx/>
+              <a:buFontTx/>
+              <a:buNone/>
+              <a:tabLst/>
+              <a:defRPr/>
+            </a:pPr>
+            <a:endParaRPr kumimoji="0" lang="en-US" sz="1800" b="0" i="0" u="none" strike="noStrike" kern="1200" cap="none" spc="0" normalizeH="0" baseline="0" noProof="0">
+              <a:ln>
+                <a:noFill/>
+              </a:ln>
+              <a:solidFill>
+                <a:prstClr val="white"/>
+              </a:solidFill>
+              <a:effectLst/>
+              <a:uLnTx/>
+              <a:uFillTx/>
+              <a:latin typeface="Calibri" panose="020F0502020204030204"/>
+              <a:ea typeface="+mn-ea"/>
+              <a:cs typeface="+mn-cs"/>
+            </a:endParaRPr>
+          </a:p>
+        </p:txBody>
+      </p:sp>
+      <p:sp>
+        <p:nvSpPr>
+          <p:cNvPr id="100" name="Rectangle 99">
+            <a:extLst>
+              <a:ext uri="{FF2B5EF4-FFF2-40B4-BE49-F238E27FC236}">
+                <a16:creationId xmlns:a16="http://schemas.microsoft.com/office/drawing/2014/main" id="{A67483D0-BAEB-4927-88AD-76F5DA8468DE}"/>
+              </a:ext>
+              <a:ext uri="{C183D7F6-B498-43B3-948B-1728B52AA6E4}">
+                <adec:decorative xmlns:adec="http://schemas.microsoft.com/office/drawing/2017/decorative" val="1"/>
+              </a:ext>
+            </a:extLst>
+          </p:cNvPr>
+          <p:cNvSpPr>
+            <a:spLocks noGrp="1" noRot="1" noChangeAspect="1" noMove="1" noResize="1" noEditPoints="1" noAdjustHandles="1" noChangeArrowheads="1" noChangeShapeType="1" noTextEdit="1"/>
+          </p:cNvSpPr>
+          <p:nvPr>
+            <p:extLst>
+              <p:ext uri="{386F3935-93C4-4BCD-93E2-E3B085C9AB24}">
+                <p16:designElem xmlns:p16="http://schemas.microsoft.com/office/powerpoint/2015/main" val="1"/>
+              </p:ext>
+            </p:extLst>
+          </p:nvPr>
+        </p:nvSpPr>
+        <p:spPr>
+          <a:xfrm>
+            <a:off x="522494" y="4565724"/>
+            <a:ext cx="128016" cy="653903"/>
+          </a:xfrm>
+          <a:prstGeom prst="rect">
+            <a:avLst/>
+          </a:prstGeom>
+          <a:solidFill>
+            <a:schemeClr val="accent2"/>
+          </a:solidFill>
           <a:ln>
             <a:noFill/>
           </a:ln>
@@ -21776,16 +23134,21 @@
           <a:lstStyle/>
           <a:p>
             <a:pPr algn="ctr"/>
-            <a:endParaRPr lang="en-US"/>
+            <a:endParaRPr lang="en-US">
+              <a:solidFill>
+                <a:prstClr val="white"/>
+              </a:solidFill>
+              <a:latin typeface="Calibri" panose="020F0502020204030204"/>
+            </a:endParaRPr>
           </a:p>
         </p:txBody>
       </p:sp>
       <p:sp>
         <p:nvSpPr>
-          <p:cNvPr id="81" name="Rectangle 80">
+          <p:cNvPr id="102" name="Rectangle 101">
             <a:extLst>
               <a:ext uri="{FF2B5EF4-FFF2-40B4-BE49-F238E27FC236}">
-                <a16:creationId xmlns:a16="http://schemas.microsoft.com/office/drawing/2014/main" id="{3F0BE7ED-7814-4273-B18A-F26CC0380380}"/>
+                <a16:creationId xmlns:a16="http://schemas.microsoft.com/office/drawing/2014/main" id="{0DBB7B12-4298-4CFB-B539-44A91C930328}"/>
               </a:ext>
               <a:ext uri="{C183D7F6-B498-43B3-948B-1728B52AA6E4}">
                 <adec:decorative xmlns:adec="http://schemas.microsoft.com/office/drawing/2017/decorative" val="1"/>
@@ -21804,32 +23167,20 @@
           </p:nvPr>
         </p:nvSpPr>
         <p:spPr>
-          <a:xfrm flipH="1">
-            <a:off x="-4" y="6408742"/>
-            <a:ext cx="8115300" cy="449258"/>
+          <a:xfrm rot="5400000">
+            <a:off x="2394346" y="4893056"/>
+            <a:ext cx="1463040" cy="18288"/>
           </a:xfrm>
           <a:prstGeom prst="rect">
             <a:avLst/>
           </a:prstGeom>
-          <a:gradFill>
-            <a:gsLst>
-              <a:gs pos="28000">
-                <a:schemeClr val="accent1">
-                  <a:lumMod val="75000"/>
-                  <a:alpha val="59000"/>
-                </a:schemeClr>
-              </a:gs>
-              <a:gs pos="100000">
-                <a:srgbClr val="000000">
-                  <a:alpha val="70000"/>
-                </a:srgbClr>
-              </a:gs>
-            </a:gsLst>
-            <a:lin ang="11400000" scaled="0"/>
-          </a:gradFill>
-          <a:ln>
+          <a:solidFill>
+            <a:srgbClr val="D5D5D5"/>
+          </a:solidFill>
+          <a:ln w="3175">
             <a:noFill/>
           </a:ln>
+          <a:effectLst/>
         </p:spPr>
         <p:style>
           <a:lnRef idx="2">
@@ -21851,17 +23202,46 @@
           <a:bodyPr rtlCol="0" anchor="ctr"/>
           <a:lstStyle/>
           <a:p>
-            <a:pPr algn="ctr"/>
-            <a:endParaRPr lang="en-US"/>
+            <a:pPr marL="0" marR="0" lvl="0" indent="0" algn="ctr" defTabSz="914400" rtl="0" eaLnBrk="1" fontAlgn="auto" latinLnBrk="0" hangingPunct="1">
+              <a:lnSpc>
+                <a:spcPct val="100000"/>
+              </a:lnSpc>
+              <a:spcBef>
+                <a:spcPts val="0"/>
+              </a:spcBef>
+              <a:spcAft>
+                <a:spcPts val="0"/>
+              </a:spcAft>
+              <a:buClrTx/>
+              <a:buSzTx/>
+              <a:buFontTx/>
+              <a:buNone/>
+              <a:tabLst/>
+              <a:defRPr/>
+            </a:pPr>
+            <a:endParaRPr kumimoji="0" lang="en-US" sz="1800" b="0" i="0" u="none" strike="noStrike" kern="1200" cap="none" spc="0" normalizeH="0" baseline="0" noProof="0">
+              <a:ln>
+                <a:noFill/>
+              </a:ln>
+              <a:solidFill>
+                <a:prstClr val="white"/>
+              </a:solidFill>
+              <a:effectLst/>
+              <a:uLnTx/>
+              <a:uFillTx/>
+              <a:latin typeface="Calibri" panose="020F0502020204030204"/>
+              <a:ea typeface="+mn-ea"/>
+              <a:cs typeface="+mn-cs"/>
+            </a:endParaRPr>
           </a:p>
         </p:txBody>
       </p:sp>
       <p:sp>
         <p:nvSpPr>
-          <p:cNvPr id="2" name="TextBox 1">
+          <p:cNvPr id="4" name="TextBox 3">
             <a:extLst>
               <a:ext uri="{FF2B5EF4-FFF2-40B4-BE49-F238E27FC236}">
-                <a16:creationId xmlns:a16="http://schemas.microsoft.com/office/drawing/2014/main" id="{B4300520-0834-4B66-8C44-541E4356DA46}"/>
+                <a16:creationId xmlns:a16="http://schemas.microsoft.com/office/drawing/2014/main" id="{03DDB894-502D-4473-8189-C7F7050B360F}"/>
               </a:ext>
             </a:extLst>
           </p:cNvPr>
@@ -21870,8 +23250,129 @@
         </p:nvSpPr>
         <p:spPr>
           <a:xfrm>
-            <a:off x="8486454" y="4457343"/>
-            <a:ext cx="3138601" cy="1600438"/>
+            <a:off x="3360563" y="3849688"/>
+            <a:ext cx="3315810" cy="2105025"/>
+          </a:xfrm>
+          <a:prstGeom prst="rect">
+            <a:avLst/>
+          </a:prstGeom>
+        </p:spPr>
+        <p:txBody>
+          <a:bodyPr vert="horz" lIns="91440" tIns="45720" rIns="91440" bIns="45720" rtlCol="0" anchor="ctr">
+            <a:normAutofit fontScale="92500" lnSpcReduction="10000"/>
+          </a:bodyPr>
+          <a:lstStyle/>
+          <a:p>
+            <a:pPr defTabSz="914400">
+              <a:lnSpc>
+                <a:spcPct val="90000"/>
+              </a:lnSpc>
+              <a:spcAft>
+                <a:spcPts val="600"/>
+              </a:spcAft>
+            </a:pPr>
+            <a:r>
+              <a:rPr lang="en-US" sz="1900" dirty="0">
+                <a:latin typeface="+mj-lt"/>
+              </a:rPr>
+              <a:t>230 BCE</a:t>
+            </a:r>
+          </a:p>
+          <a:p>
+            <a:pPr marL="285750" indent="-228600" defTabSz="914400">
+              <a:lnSpc>
+                <a:spcPct val="90000"/>
+              </a:lnSpc>
+              <a:spcAft>
+                <a:spcPts val="600"/>
+              </a:spcAft>
+              <a:buFont typeface="Arial" panose="020B0604020202020204" pitchFamily="34" charset="0"/>
+              <a:buChar char="•"/>
+            </a:pPr>
+            <a:r>
+              <a:rPr lang="en-US" sz="1400" dirty="0"/>
+              <a:t>Attalus I Soter of Pergamon defeats the Galatian invasion of Pergamon. He marries the Galatian princess </a:t>
+            </a:r>
+            <a:r>
+              <a:rPr lang="en-US" sz="1400" dirty="0" err="1"/>
+              <a:t>Berena</a:t>
+            </a:r>
+            <a:r>
+              <a:rPr lang="en-US" sz="1400" dirty="0"/>
+              <a:t> and an alliance is formed between the Galatians and Pergamon.</a:t>
+            </a:r>
+          </a:p>
+          <a:p>
+            <a:pPr marL="285750" indent="-228600" defTabSz="914400">
+              <a:lnSpc>
+                <a:spcPct val="90000"/>
+              </a:lnSpc>
+              <a:spcAft>
+                <a:spcPts val="600"/>
+              </a:spcAft>
+              <a:buFont typeface="Arial" panose="020B0604020202020204" pitchFamily="34" charset="0"/>
+              <a:buChar char="•"/>
+            </a:pPr>
+            <a:r>
+              <a:rPr lang="en-US" sz="1400" b="1" dirty="0"/>
+              <a:t>King </a:t>
+            </a:r>
+            <a:r>
+              <a:rPr lang="en-US" sz="1400" b="1" dirty="0" err="1"/>
+              <a:t>Kubera</a:t>
+            </a:r>
+            <a:r>
+              <a:rPr lang="en-US" sz="1400" b="1" dirty="0"/>
+              <a:t> of Bhattiprolu joins the rebellion against the Maurya. The resulting geographic isolation allows rebel factions to consolidate power in Karnataka.</a:t>
+            </a:r>
+          </a:p>
+        </p:txBody>
+      </p:sp>
+      <p:pic>
+        <p:nvPicPr>
+          <p:cNvPr id="8" name="Picture 7" descr="Map&#10;&#10;Description automatically generated">
+            <a:extLst>
+              <a:ext uri="{FF2B5EF4-FFF2-40B4-BE49-F238E27FC236}">
+                <a16:creationId xmlns:a16="http://schemas.microsoft.com/office/drawing/2014/main" id="{26229E2D-1CAB-422C-BDCD-21FF6BBF4947}"/>
+              </a:ext>
+            </a:extLst>
+          </p:cNvPr>
+          <p:cNvPicPr>
+            <a:picLocks noChangeAspect="1"/>
+          </p:cNvPicPr>
+          <p:nvPr/>
+        </p:nvPicPr>
+        <p:blipFill rotWithShape="1">
+          <a:blip r:embed="rId4"/>
+          <a:srcRect l="5042" r="8771" b="3"/>
+          <a:stretch/>
+        </p:blipFill>
+        <p:spPr>
+          <a:xfrm>
+            <a:off x="7048500" y="365109"/>
+            <a:ext cx="4621006" cy="5811838"/>
+          </a:xfrm>
+          <a:prstGeom prst="rect">
+            <a:avLst/>
+          </a:prstGeom>
+        </p:spPr>
+      </p:pic>
+      <p:sp>
+        <p:nvSpPr>
+          <p:cNvPr id="2" name="TextBox 1">
+            <a:extLst>
+              <a:ext uri="{FF2B5EF4-FFF2-40B4-BE49-F238E27FC236}">
+                <a16:creationId xmlns:a16="http://schemas.microsoft.com/office/drawing/2014/main" id="{A03DE87A-4E3A-4B91-B52E-7BDCA16B67D4}"/>
+              </a:ext>
+            </a:extLst>
+          </p:cNvPr>
+          <p:cNvSpPr txBox="1"/>
+          <p:nvPr/>
+        </p:nvSpPr>
+        <p:spPr>
+          <a:xfrm>
+            <a:off x="586502" y="3754111"/>
+            <a:ext cx="2594228" cy="2200602"/>
           </a:xfrm>
           <a:prstGeom prst="rect">
             <a:avLst/>
@@ -21884,41 +23385,34 @@
           </a:bodyPr>
           <a:lstStyle/>
           <a:p>
-            <a:r>
-              <a:rPr lang="en-US" sz="1400" dirty="0"/>
-              <a:t>*It also stands to mention that </a:t>
-            </a:r>
-            <a:r>
-              <a:rPr lang="en-US" sz="1400" dirty="0" err="1"/>
-              <a:t>Ptolemaioi</a:t>
-            </a:r>
-            <a:r>
-              <a:rPr lang="en-US" sz="1400" dirty="0"/>
-              <a:t> made gains against the Seleukids in the Third Syrian War, retaining </a:t>
-            </a:r>
-            <a:r>
-              <a:rPr lang="en-US" sz="1400" dirty="0" err="1"/>
-              <a:t>Ephesos</a:t>
-            </a:r>
-            <a:r>
-              <a:rPr lang="en-US" sz="1400" dirty="0"/>
-              <a:t> and </a:t>
-            </a:r>
-            <a:r>
-              <a:rPr lang="en-US" sz="1400" dirty="0" err="1"/>
-              <a:t>Seleukeia</a:t>
-            </a:r>
-            <a:r>
-              <a:rPr lang="en-US" sz="1400" dirty="0"/>
-              <a:t> Pieria near </a:t>
-            </a:r>
-            <a:r>
-              <a:rPr lang="en-US" sz="1400" dirty="0" err="1"/>
-              <a:t>Antiocheia</a:t>
-            </a:r>
-            <a:r>
-              <a:rPr lang="en-US" sz="1400" dirty="0"/>
-              <a:t>. This will ultimately be the main cause of the Fourth Syrian War in 219 BCE.</a:t>
+            <a:pPr>
+              <a:spcAft>
+                <a:spcPts val="600"/>
+              </a:spcAft>
+            </a:pPr>
+            <a:r>
+              <a:rPr lang="en-US" sz="1200" dirty="0"/>
+              <a:t>*In Egypt, Ptolemy III builds the Temple of Horus, boosting the influence of ancient Egyptian religion within his empire.</a:t>
+            </a:r>
+            <a:endParaRPr lang="en-US" sz="300" dirty="0"/>
+          </a:p>
+          <a:p>
+            <a:pPr>
+              <a:spcAft>
+                <a:spcPts val="600"/>
+              </a:spcAft>
+            </a:pPr>
+            <a:r>
+              <a:rPr lang="en-US" sz="1200" dirty="0"/>
+              <a:t>**The Roman navy occupies the island of Corfu in an effort to curb Illyrian piracy on their trade fleets. This does not result in war with </a:t>
+            </a:r>
+            <a:r>
+              <a:rPr lang="en-US" sz="1200" dirty="0" err="1"/>
+              <a:t>Makedon</a:t>
+            </a:r>
+            <a:r>
+              <a:rPr lang="en-US" sz="1200" dirty="0"/>
+              <a:t>, as the island had been previously taken by Illyrian pirates and its Greek inhabitants expelled.</a:t>
             </a:r>
           </a:p>
         </p:txBody>
@@ -21926,7 +23420,7 @@
     </p:spTree>
     <p:extLst>
       <p:ext uri="{BB962C8B-B14F-4D97-AF65-F5344CB8AC3E}">
-        <p14:creationId xmlns:p14="http://schemas.microsoft.com/office/powerpoint/2010/main" val="370924517"/>
+        <p14:creationId xmlns:p14="http://schemas.microsoft.com/office/powerpoint/2010/main" val="1522626682"/>
       </p:ext>
     </p:extLst>
   </p:cSld>
@@ -21936,7 +23430,7 @@
 </p:sld>
 </file>
 
-<file path=ppt/slides/slide35.xml><?xml version="1.0" encoding="utf-8"?>
+<file path=ppt/slides/slide38.xml><?xml version="1.0" encoding="utf-8"?>
 <p:sld xmlns:a="http://schemas.openxmlformats.org/drawingml/2006/main" xmlns:r="http://schemas.openxmlformats.org/officeDocument/2006/relationships" xmlns:p="http://schemas.openxmlformats.org/presentationml/2006/main">
   <p:cSld>
     <p:bg>
@@ -21961,12 +23455,12 @@
           <a:chExt cx="0" cy="0"/>
         </a:xfrm>
       </p:grpSpPr>
-      <p:sp useBgFill="1">
+      <p:sp>
         <p:nvSpPr>
-          <p:cNvPr id="86" name="Rectangle 85">
+          <p:cNvPr id="128" name="Freeform: Shape 127">
             <a:extLst>
               <a:ext uri="{FF2B5EF4-FFF2-40B4-BE49-F238E27FC236}">
-                <a16:creationId xmlns:a16="http://schemas.microsoft.com/office/drawing/2014/main" id="{F13C74B1-5B17-4795-BED0-7140497B445A}"/>
+                <a16:creationId xmlns:a16="http://schemas.microsoft.com/office/drawing/2014/main" id="{F60FCA6E-0894-46CD-BD49-5955A51E0084}"/>
               </a:ext>
               <a:ext uri="{C183D7F6-B498-43B3-948B-1728B52AA6E4}">
                 <adec:decorative xmlns:adec="http://schemas.microsoft.com/office/drawing/2017/decorative" val="1"/>
@@ -21986,12 +23480,108 @@
         </p:nvSpPr>
         <p:spPr>
           <a:xfrm>
-            <a:off x="0" y="0"/>
-            <a:ext cx="12188952" cy="6858000"/>
+            <a:off x="6831955" y="5346696"/>
+            <a:ext cx="5360045" cy="1511304"/>
           </a:xfrm>
-          <a:prstGeom prst="rect">
+          <a:custGeom>
             <a:avLst/>
-          </a:prstGeom>
+            <a:gdLst>
+              <a:gd name="connsiteX0" fmla="*/ 4545473 w 5360045"/>
+              <a:gd name="connsiteY0" fmla="*/ 0 h 1511304"/>
+              <a:gd name="connsiteX1" fmla="*/ 5360045 w 5360045"/>
+              <a:gd name="connsiteY1" fmla="*/ 0 h 1511304"/>
+              <a:gd name="connsiteX2" fmla="*/ 5360045 w 5360045"/>
+              <a:gd name="connsiteY2" fmla="*/ 1046730 h 1511304"/>
+              <a:gd name="connsiteX3" fmla="*/ 5360045 w 5360045"/>
+              <a:gd name="connsiteY3" fmla="*/ 1508760 h 1511304"/>
+              <a:gd name="connsiteX4" fmla="*/ 5360045 w 5360045"/>
+              <a:gd name="connsiteY4" fmla="*/ 1511304 h 1511304"/>
+              <a:gd name="connsiteX5" fmla="*/ 4545474 w 5360045"/>
+              <a:gd name="connsiteY5" fmla="*/ 1511304 h 1511304"/>
+              <a:gd name="connsiteX6" fmla="*/ 2525897 w 5360045"/>
+              <a:gd name="connsiteY6" fmla="*/ 1511304 h 1511304"/>
+              <a:gd name="connsiteX7" fmla="*/ 0 w 5360045"/>
+              <a:gd name="connsiteY7" fmla="*/ 1511304 h 1511304"/>
+              <a:gd name="connsiteX8" fmla="*/ 697617 w 5360045"/>
+              <a:gd name="connsiteY8" fmla="*/ 3 h 1511304"/>
+              <a:gd name="connsiteX9" fmla="*/ 4545473 w 5360045"/>
+              <a:gd name="connsiteY9" fmla="*/ 3 h 1511304"/>
+            </a:gdLst>
+            <a:ahLst/>
+            <a:cxnLst>
+              <a:cxn ang="0">
+                <a:pos x="connsiteX0" y="connsiteY0"/>
+              </a:cxn>
+              <a:cxn ang="0">
+                <a:pos x="connsiteX1" y="connsiteY1"/>
+              </a:cxn>
+              <a:cxn ang="0">
+                <a:pos x="connsiteX2" y="connsiteY2"/>
+              </a:cxn>
+              <a:cxn ang="0">
+                <a:pos x="connsiteX3" y="connsiteY3"/>
+              </a:cxn>
+              <a:cxn ang="0">
+                <a:pos x="connsiteX4" y="connsiteY4"/>
+              </a:cxn>
+              <a:cxn ang="0">
+                <a:pos x="connsiteX5" y="connsiteY5"/>
+              </a:cxn>
+              <a:cxn ang="0">
+                <a:pos x="connsiteX6" y="connsiteY6"/>
+              </a:cxn>
+              <a:cxn ang="0">
+                <a:pos x="connsiteX7" y="connsiteY7"/>
+              </a:cxn>
+              <a:cxn ang="0">
+                <a:pos x="connsiteX8" y="connsiteY8"/>
+              </a:cxn>
+              <a:cxn ang="0">
+                <a:pos x="connsiteX9" y="connsiteY9"/>
+              </a:cxn>
+            </a:cxnLst>
+            <a:rect l="l" t="t" r="r" b="b"/>
+            <a:pathLst>
+              <a:path w="5360045" h="1511304">
+                <a:moveTo>
+                  <a:pt x="4545473" y="0"/>
+                </a:moveTo>
+                <a:lnTo>
+                  <a:pt x="5360045" y="0"/>
+                </a:lnTo>
+                <a:lnTo>
+                  <a:pt x="5360045" y="1046730"/>
+                </a:lnTo>
+                <a:lnTo>
+                  <a:pt x="5360045" y="1508760"/>
+                </a:lnTo>
+                <a:lnTo>
+                  <a:pt x="5360045" y="1511304"/>
+                </a:lnTo>
+                <a:lnTo>
+                  <a:pt x="4545474" y="1511304"/>
+                </a:lnTo>
+                <a:lnTo>
+                  <a:pt x="2525897" y="1511304"/>
+                </a:lnTo>
+                <a:lnTo>
+                  <a:pt x="0" y="1511304"/>
+                </a:lnTo>
+                <a:lnTo>
+                  <a:pt x="697617" y="3"/>
+                </a:lnTo>
+                <a:lnTo>
+                  <a:pt x="4545473" y="3"/>
+                </a:lnTo>
+                <a:close/>
+              </a:path>
+            </a:pathLst>
+          </a:custGeom>
+          <a:solidFill>
+            <a:srgbClr val="404040">
+              <a:alpha val="84706"/>
+            </a:srgbClr>
+          </a:solidFill>
           <a:ln>
             <a:noFill/>
           </a:ln>
@@ -22013,7 +23603,9 @@
           </a:fontRef>
         </p:style>
         <p:txBody>
-          <a:bodyPr rtlCol="0" anchor="ctr"/>
+          <a:bodyPr wrap="square" rtlCol="0" anchor="ctr">
+            <a:noAutofit/>
+          </a:bodyPr>
           <a:lstStyle/>
           <a:p>
             <a:pPr algn="ctr"/>
@@ -22023,10 +23615,10 @@
       </p:sp>
       <p:sp>
         <p:nvSpPr>
-          <p:cNvPr id="91" name="sketchy line">
+          <p:cNvPr id="130" name="Freeform: Shape 129">
             <a:extLst>
               <a:ext uri="{FF2B5EF4-FFF2-40B4-BE49-F238E27FC236}">
-                <a16:creationId xmlns:a16="http://schemas.microsoft.com/office/drawing/2014/main" id="{D4974D33-8DC5-464E-8C6D-BE58F0669C17}"/>
+                <a16:creationId xmlns:a16="http://schemas.microsoft.com/office/drawing/2014/main" id="{E78C6E4B-A1F1-4B6C-97EC-BE997495D6AC}"/>
               </a:ext>
               <a:ext uri="{C183D7F6-B498-43B3-948B-1728B52AA6E4}">
                 <adec:decorative xmlns:adec="http://schemas.microsoft.com/office/drawing/2017/decorative" val="1"/>
@@ -22046,38 +23638,48 @@
         </p:nvSpPr>
         <p:spPr>
           <a:xfrm>
-            <a:off x="640080" y="2586994"/>
-            <a:ext cx="3474720" cy="18288"/>
+            <a:off x="0" y="5346694"/>
+            <a:ext cx="7346605" cy="1511306"/>
           </a:xfrm>
           <a:custGeom>
             <a:avLst/>
             <a:gdLst>
-              <a:gd name="connsiteX0" fmla="*/ 0 w 3474720"/>
-              <a:gd name="connsiteY0" fmla="*/ 0 h 18288"/>
-              <a:gd name="connsiteX1" fmla="*/ 694944 w 3474720"/>
-              <a:gd name="connsiteY1" fmla="*/ 0 h 18288"/>
-              <a:gd name="connsiteX2" fmla="*/ 1355141 w 3474720"/>
-              <a:gd name="connsiteY2" fmla="*/ 0 h 18288"/>
-              <a:gd name="connsiteX3" fmla="*/ 2015338 w 3474720"/>
-              <a:gd name="connsiteY3" fmla="*/ 0 h 18288"/>
-              <a:gd name="connsiteX4" fmla="*/ 2779776 w 3474720"/>
-              <a:gd name="connsiteY4" fmla="*/ 0 h 18288"/>
-              <a:gd name="connsiteX5" fmla="*/ 3474720 w 3474720"/>
-              <a:gd name="connsiteY5" fmla="*/ 0 h 18288"/>
-              <a:gd name="connsiteX6" fmla="*/ 3474720 w 3474720"/>
-              <a:gd name="connsiteY6" fmla="*/ 18288 h 18288"/>
-              <a:gd name="connsiteX7" fmla="*/ 2779776 w 3474720"/>
-              <a:gd name="connsiteY7" fmla="*/ 18288 h 18288"/>
-              <a:gd name="connsiteX8" fmla="*/ 2189074 w 3474720"/>
-              <a:gd name="connsiteY8" fmla="*/ 18288 h 18288"/>
-              <a:gd name="connsiteX9" fmla="*/ 1528877 w 3474720"/>
-              <a:gd name="connsiteY9" fmla="*/ 18288 h 18288"/>
-              <a:gd name="connsiteX10" fmla="*/ 868680 w 3474720"/>
-              <a:gd name="connsiteY10" fmla="*/ 18288 h 18288"/>
-              <a:gd name="connsiteX11" fmla="*/ 0 w 3474720"/>
-              <a:gd name="connsiteY11" fmla="*/ 18288 h 18288"/>
-              <a:gd name="connsiteX12" fmla="*/ 0 w 3474720"/>
-              <a:gd name="connsiteY12" fmla="*/ 0 h 18288"/>
+              <a:gd name="connsiteX0" fmla="*/ 0 w 7346605"/>
+              <a:gd name="connsiteY0" fmla="*/ 0 h 1511306"/>
+              <a:gd name="connsiteX1" fmla="*/ 239486 w 7346605"/>
+              <a:gd name="connsiteY1" fmla="*/ 0 h 1511306"/>
+              <a:gd name="connsiteX2" fmla="*/ 1209568 w 7346605"/>
+              <a:gd name="connsiteY2" fmla="*/ 0 h 1511306"/>
+              <a:gd name="connsiteX3" fmla="*/ 2405743 w 7346605"/>
+              <a:gd name="connsiteY3" fmla="*/ 0 h 1511306"/>
+              <a:gd name="connsiteX4" fmla="*/ 2405743 w 7346605"/>
+              <a:gd name="connsiteY4" fmla="*/ 2544 h 1511306"/>
+              <a:gd name="connsiteX5" fmla="*/ 2801131 w 7346605"/>
+              <a:gd name="connsiteY5" fmla="*/ 2544 h 1511306"/>
+              <a:gd name="connsiteX6" fmla="*/ 2801131 w 7346605"/>
+              <a:gd name="connsiteY6" fmla="*/ 0 h 1511306"/>
+              <a:gd name="connsiteX7" fmla="*/ 7346605 w 7346605"/>
+              <a:gd name="connsiteY7" fmla="*/ 0 h 1511306"/>
+              <a:gd name="connsiteX8" fmla="*/ 6648988 w 7346605"/>
+              <a:gd name="connsiteY8" fmla="*/ 1511301 h 1511306"/>
+              <a:gd name="connsiteX9" fmla="*/ 2801132 w 7346605"/>
+              <a:gd name="connsiteY9" fmla="*/ 1511301 h 1511306"/>
+              <a:gd name="connsiteX10" fmla="*/ 2801132 w 7346605"/>
+              <a:gd name="connsiteY10" fmla="*/ 1511304 h 1511306"/>
+              <a:gd name="connsiteX11" fmla="*/ 2405743 w 7346605"/>
+              <a:gd name="connsiteY11" fmla="*/ 1511304 h 1511306"/>
+              <a:gd name="connsiteX12" fmla="*/ 2405743 w 7346605"/>
+              <a:gd name="connsiteY12" fmla="*/ 1511306 h 1511306"/>
+              <a:gd name="connsiteX13" fmla="*/ 1333411 w 7346605"/>
+              <a:gd name="connsiteY13" fmla="*/ 1511306 h 1511306"/>
+              <a:gd name="connsiteX14" fmla="*/ 1219208 w 7346605"/>
+              <a:gd name="connsiteY14" fmla="*/ 1511306 h 1511306"/>
+              <a:gd name="connsiteX15" fmla="*/ 1209568 w 7346605"/>
+              <a:gd name="connsiteY15" fmla="*/ 1511306 h 1511306"/>
+              <a:gd name="connsiteX16" fmla="*/ 239486 w 7346605"/>
+              <a:gd name="connsiteY16" fmla="*/ 1511306 h 1511306"/>
+              <a:gd name="connsiteX17" fmla="*/ 0 w 7346605"/>
+              <a:gd name="connsiteY17" fmla="*/ 1511306 h 1511306"/>
             </a:gdLst>
             <a:ahLst/>
             <a:cxnLst>
@@ -22120,163 +23722,88 @@
               <a:cxn ang="0">
                 <a:pos x="connsiteX12" y="connsiteY12"/>
               </a:cxn>
+              <a:cxn ang="0">
+                <a:pos x="connsiteX13" y="connsiteY13"/>
+              </a:cxn>
+              <a:cxn ang="0">
+                <a:pos x="connsiteX14" y="connsiteY14"/>
+              </a:cxn>
+              <a:cxn ang="0">
+                <a:pos x="connsiteX15" y="connsiteY15"/>
+              </a:cxn>
+              <a:cxn ang="0">
+                <a:pos x="connsiteX16" y="connsiteY16"/>
+              </a:cxn>
+              <a:cxn ang="0">
+                <a:pos x="connsiteX17" y="connsiteY17"/>
+              </a:cxn>
             </a:cxnLst>
             <a:rect l="l" t="t" r="r" b="b"/>
             <a:pathLst>
-              <a:path w="3474720" h="18288" fill="none" extrusionOk="0">
+              <a:path w="7346605" h="1511306">
                 <a:moveTo>
                   <a:pt x="0" y="0"/>
                 </a:moveTo>
-                <a:cubicBezTo>
-                  <a:pt x="224454" y="-14544"/>
-                  <a:pt x="495407" y="26540"/>
-                  <a:pt x="694944" y="0"/>
-                </a:cubicBezTo>
-                <a:cubicBezTo>
-                  <a:pt x="894481" y="-26540"/>
-                  <a:pt x="1130063" y="24713"/>
-                  <a:pt x="1355141" y="0"/>
-                </a:cubicBezTo>
-                <a:cubicBezTo>
-                  <a:pt x="1580219" y="-24713"/>
-                  <a:pt x="1820099" y="26695"/>
-                  <a:pt x="2015338" y="0"/>
-                </a:cubicBezTo>
-                <a:cubicBezTo>
-                  <a:pt x="2210577" y="-26695"/>
-                  <a:pt x="2402045" y="165"/>
-                  <a:pt x="2779776" y="0"/>
-                </a:cubicBezTo>
-                <a:cubicBezTo>
-                  <a:pt x="3157507" y="-165"/>
-                  <a:pt x="3286859" y="-15571"/>
-                  <a:pt x="3474720" y="0"/>
-                </a:cubicBezTo>
-                <a:cubicBezTo>
-                  <a:pt x="3474286" y="7551"/>
-                  <a:pt x="3474253" y="9822"/>
-                  <a:pt x="3474720" y="18288"/>
-                </a:cubicBezTo>
-                <a:cubicBezTo>
-                  <a:pt x="3233904" y="29845"/>
-                  <a:pt x="2945134" y="-5256"/>
-                  <a:pt x="2779776" y="18288"/>
-                </a:cubicBezTo>
-                <a:cubicBezTo>
-                  <a:pt x="2614418" y="41832"/>
-                  <a:pt x="2339768" y="22709"/>
-                  <a:pt x="2189074" y="18288"/>
-                </a:cubicBezTo>
-                <a:cubicBezTo>
-                  <a:pt x="2038380" y="13867"/>
-                  <a:pt x="1817434" y="-4947"/>
-                  <a:pt x="1528877" y="18288"/>
-                </a:cubicBezTo>
-                <a:cubicBezTo>
-                  <a:pt x="1240320" y="41523"/>
-                  <a:pt x="1042447" y="37198"/>
-                  <a:pt x="868680" y="18288"/>
-                </a:cubicBezTo>
-                <a:cubicBezTo>
-                  <a:pt x="694913" y="-622"/>
-                  <a:pt x="233232" y="44909"/>
-                  <a:pt x="0" y="18288"/>
-                </a:cubicBezTo>
-                <a:cubicBezTo>
-                  <a:pt x="60" y="11696"/>
-                  <a:pt x="66" y="3758"/>
-                  <a:pt x="0" y="0"/>
-                </a:cubicBezTo>
-                <a:close/>
-              </a:path>
-              <a:path w="3474720" h="18288" stroke="0" extrusionOk="0">
-                <a:moveTo>
-                  <a:pt x="0" y="0"/>
-                </a:moveTo>
-                <a:cubicBezTo>
-                  <a:pt x="202328" y="-14716"/>
-                  <a:pt x="332722" y="-11499"/>
-                  <a:pt x="625450" y="0"/>
-                </a:cubicBezTo>
-                <a:cubicBezTo>
-                  <a:pt x="918178" y="11499"/>
-                  <a:pt x="1096688" y="5123"/>
-                  <a:pt x="1389888" y="0"/>
-                </a:cubicBezTo>
-                <a:cubicBezTo>
-                  <a:pt x="1683088" y="-5123"/>
-                  <a:pt x="1835981" y="-14038"/>
-                  <a:pt x="1980590" y="0"/>
-                </a:cubicBezTo>
-                <a:cubicBezTo>
-                  <a:pt x="2125199" y="14038"/>
-                  <a:pt x="2396099" y="-7203"/>
-                  <a:pt x="2571293" y="0"/>
-                </a:cubicBezTo>
-                <a:cubicBezTo>
-                  <a:pt x="2746487" y="7203"/>
-                  <a:pt x="3041609" y="-12036"/>
-                  <a:pt x="3474720" y="0"/>
-                </a:cubicBezTo>
-                <a:cubicBezTo>
-                  <a:pt x="3474638" y="4406"/>
-                  <a:pt x="3474631" y="9982"/>
-                  <a:pt x="3474720" y="18288"/>
-                </a:cubicBezTo>
-                <a:cubicBezTo>
-                  <a:pt x="3324873" y="21876"/>
-                  <a:pt x="3136771" y="12587"/>
-                  <a:pt x="2814523" y="18288"/>
-                </a:cubicBezTo>
-                <a:cubicBezTo>
-                  <a:pt x="2492275" y="23989"/>
-                  <a:pt x="2294402" y="47111"/>
-                  <a:pt x="2154326" y="18288"/>
-                </a:cubicBezTo>
-                <a:cubicBezTo>
-                  <a:pt x="2014250" y="-10535"/>
-                  <a:pt x="1820317" y="33903"/>
-                  <a:pt x="1494130" y="18288"/>
-                </a:cubicBezTo>
-                <a:cubicBezTo>
-                  <a:pt x="1167943" y="2673"/>
-                  <a:pt x="948432" y="14868"/>
-                  <a:pt x="729691" y="18288"/>
-                </a:cubicBezTo>
-                <a:cubicBezTo>
-                  <a:pt x="510950" y="21708"/>
-                  <a:pt x="264032" y="24354"/>
-                  <a:pt x="0" y="18288"/>
-                </a:cubicBezTo>
-                <a:cubicBezTo>
-                  <a:pt x="189" y="14288"/>
-                  <a:pt x="-703" y="3747"/>
-                  <a:pt x="0" y="0"/>
-                </a:cubicBezTo>
+                <a:lnTo>
+                  <a:pt x="239486" y="0"/>
+                </a:lnTo>
+                <a:lnTo>
+                  <a:pt x="1209568" y="0"/>
+                </a:lnTo>
+                <a:lnTo>
+                  <a:pt x="2405743" y="0"/>
+                </a:lnTo>
+                <a:lnTo>
+                  <a:pt x="2405743" y="2544"/>
+                </a:lnTo>
+                <a:lnTo>
+                  <a:pt x="2801131" y="2544"/>
+                </a:lnTo>
+                <a:lnTo>
+                  <a:pt x="2801131" y="0"/>
+                </a:lnTo>
+                <a:lnTo>
+                  <a:pt x="7346605" y="0"/>
+                </a:lnTo>
+                <a:lnTo>
+                  <a:pt x="6648988" y="1511301"/>
+                </a:lnTo>
+                <a:lnTo>
+                  <a:pt x="2801132" y="1511301"/>
+                </a:lnTo>
+                <a:lnTo>
+                  <a:pt x="2801132" y="1511304"/>
+                </a:lnTo>
+                <a:lnTo>
+                  <a:pt x="2405743" y="1511304"/>
+                </a:lnTo>
+                <a:lnTo>
+                  <a:pt x="2405743" y="1511306"/>
+                </a:lnTo>
+                <a:lnTo>
+                  <a:pt x="1333411" y="1511306"/>
+                </a:lnTo>
+                <a:lnTo>
+                  <a:pt x="1219208" y="1511306"/>
+                </a:lnTo>
+                <a:lnTo>
+                  <a:pt x="1209568" y="1511306"/>
+                </a:lnTo>
+                <a:lnTo>
+                  <a:pt x="239486" y="1511306"/>
+                </a:lnTo>
+                <a:lnTo>
+                  <a:pt x="0" y="1511306"/>
+                </a:lnTo>
                 <a:close/>
               </a:path>
             </a:pathLst>
           </a:custGeom>
           <a:solidFill>
-            <a:schemeClr val="accent2"/>
+            <a:srgbClr val="D0CECE"/>
           </a:solidFill>
-          <a:ln w="44450" cap="rnd">
-            <a:solidFill>
-              <a:schemeClr val="accent2"/>
-            </a:solidFill>
-            <a:round/>
-            <a:extLst>
-              <a:ext uri="{C807C97D-BFC1-408E-A445-0C87EB9F89A2}">
-                <ask:lineSketchStyleProps xmlns:ask="http://schemas.microsoft.com/office/drawing/2018/sketchyshapes" sd="2863741219">
-                  <a:prstGeom prst="rect">
-                    <a:avLst/>
-                  </a:prstGeom>
-                  <ask:type>
-                    <ask:lineSketchFreehand/>
-                  </ask:type>
-                </ask:lineSketchStyleProps>
-              </a:ext>
-            </a:extLst>
+          <a:ln>
+            <a:noFill/>
           </a:ln>
         </p:spPr>
         <p:style>
@@ -22300,10 +23827,206 @@
           <a:lstStyle/>
           <a:p>
             <a:pPr algn="ctr"/>
-            <a:endParaRPr lang="en-US"/>
+            <a:endParaRPr lang="en-US">
+              <a:solidFill>
+                <a:schemeClr val="bg1">
+                  <a:lumMod val="95000"/>
+                </a:schemeClr>
+              </a:solidFill>
+            </a:endParaRPr>
           </a:p>
         </p:txBody>
       </p:sp>
+      <p:pic>
+        <p:nvPicPr>
+          <p:cNvPr id="6" name="Picture 5">
+            <a:extLst>
+              <a:ext uri="{FF2B5EF4-FFF2-40B4-BE49-F238E27FC236}">
+                <a16:creationId xmlns:a16="http://schemas.microsoft.com/office/drawing/2014/main" id="{49AD5D7C-48BD-447B-BC06-60739105A938}"/>
+              </a:ext>
+            </a:extLst>
+          </p:cNvPr>
+          <p:cNvPicPr>
+            <a:picLocks noChangeAspect="1"/>
+          </p:cNvPicPr>
+          <p:nvPr/>
+        </p:nvPicPr>
+        <p:blipFill rotWithShape="1">
+          <a:blip r:embed="rId3">
+            <a:extLst>
+              <a:ext uri="{28A0092B-C50C-407E-A947-70E740481C1C}">
+                <a14:useLocalDpi xmlns:a14="http://schemas.microsoft.com/office/drawing/2010/main" val="0"/>
+              </a:ext>
+            </a:extLst>
+          </a:blip>
+          <a:srcRect l="3157" r="7137" b="-6"/>
+          <a:stretch/>
+        </p:blipFill>
+        <p:spPr>
+          <a:xfrm>
+            <a:off x="841248" y="604158"/>
+            <a:ext cx="6049941" cy="4350110"/>
+          </a:xfrm>
+          <a:prstGeom prst="rect">
+            <a:avLst/>
+          </a:prstGeom>
+        </p:spPr>
+      </p:pic>
+      <p:sp>
+        <p:nvSpPr>
+          <p:cNvPr id="4" name="TextBox 3">
+            <a:extLst>
+              <a:ext uri="{FF2B5EF4-FFF2-40B4-BE49-F238E27FC236}">
+                <a16:creationId xmlns:a16="http://schemas.microsoft.com/office/drawing/2014/main" id="{03DDB894-502D-4473-8189-C7F7050B360F}"/>
+              </a:ext>
+            </a:extLst>
+          </p:cNvPr>
+          <p:cNvSpPr txBox="1"/>
+          <p:nvPr/>
+        </p:nvSpPr>
+        <p:spPr>
+          <a:xfrm>
+            <a:off x="7534655" y="601315"/>
+            <a:ext cx="3432809" cy="4384342"/>
+          </a:xfrm>
+          <a:prstGeom prst="rect">
+            <a:avLst/>
+          </a:prstGeom>
+        </p:spPr>
+        <p:txBody>
+          <a:bodyPr vert="horz" lIns="91440" tIns="45720" rIns="91440" bIns="45720" rtlCol="0" anchor="ctr">
+            <a:normAutofit/>
+          </a:bodyPr>
+          <a:lstStyle/>
+          <a:p>
+            <a:pPr defTabSz="914400">
+              <a:lnSpc>
+                <a:spcPct val="90000"/>
+              </a:lnSpc>
+              <a:spcAft>
+                <a:spcPts val="600"/>
+              </a:spcAft>
+            </a:pPr>
+            <a:r>
+              <a:rPr lang="en-US" sz="3200" dirty="0">
+                <a:latin typeface="+mj-lt"/>
+              </a:rPr>
+              <a:t>228 BCE</a:t>
+            </a:r>
+          </a:p>
+          <a:p>
+            <a:pPr marL="285750" indent="-228600" defTabSz="914400">
+              <a:lnSpc>
+                <a:spcPct val="90000"/>
+              </a:lnSpc>
+              <a:spcAft>
+                <a:spcPts val="600"/>
+              </a:spcAft>
+              <a:buFont typeface="Arial" panose="020B0604020202020204" pitchFamily="34" charset="0"/>
+              <a:buChar char="•"/>
+            </a:pPr>
+            <a:r>
+              <a:rPr lang="en-US" sz="2400" dirty="0"/>
+              <a:t>Attalus I Soter and his Galatian allies defeat Antiochus </a:t>
+            </a:r>
+            <a:r>
+              <a:rPr lang="en-US" sz="2400" dirty="0" err="1"/>
+              <a:t>Hierax</a:t>
+            </a:r>
+            <a:r>
+              <a:rPr lang="en-US" sz="2400" dirty="0"/>
+              <a:t> near Tarsus. Anatolia and Cilicia are divided between Attalus and his allies.</a:t>
+            </a:r>
+            <a:endParaRPr lang="en-US" sz="2400" b="1" dirty="0"/>
+          </a:p>
+        </p:txBody>
+      </p:sp>
+      <p:sp>
+        <p:nvSpPr>
+          <p:cNvPr id="2" name="TextBox 1">
+            <a:extLst>
+              <a:ext uri="{FF2B5EF4-FFF2-40B4-BE49-F238E27FC236}">
+                <a16:creationId xmlns:a16="http://schemas.microsoft.com/office/drawing/2014/main" id="{A03DE87A-4E3A-4B91-B52E-7BDCA16B67D4}"/>
+              </a:ext>
+            </a:extLst>
+          </p:cNvPr>
+          <p:cNvSpPr txBox="1"/>
+          <p:nvPr/>
+        </p:nvSpPr>
+        <p:spPr>
+          <a:xfrm>
+            <a:off x="7534655" y="601315"/>
+            <a:ext cx="3432809" cy="523220"/>
+          </a:xfrm>
+          <a:prstGeom prst="rect">
+            <a:avLst/>
+          </a:prstGeom>
+          <a:noFill/>
+        </p:spPr>
+        <p:txBody>
+          <a:bodyPr wrap="square" rtlCol="0">
+            <a:spAutoFit/>
+          </a:bodyPr>
+          <a:lstStyle/>
+          <a:p>
+            <a:pPr>
+              <a:spcAft>
+                <a:spcPts val="600"/>
+              </a:spcAft>
+            </a:pPr>
+            <a:r>
+              <a:rPr lang="en-US" sz="1400" dirty="0"/>
+              <a:t>*In Illyria, Rome has landed in Apollonia and now besieges the </a:t>
+            </a:r>
+            <a:r>
+              <a:rPr lang="en-US" sz="1400" dirty="0" err="1"/>
+              <a:t>Ardiaei</a:t>
+            </a:r>
+            <a:r>
+              <a:rPr lang="en-US" sz="1400" dirty="0"/>
+              <a:t> capital of Shkodra.</a:t>
+            </a:r>
+          </a:p>
+        </p:txBody>
+      </p:sp>
+    </p:spTree>
+    <p:extLst>
+      <p:ext uri="{BB962C8B-B14F-4D97-AF65-F5344CB8AC3E}">
+        <p14:creationId xmlns:p14="http://schemas.microsoft.com/office/powerpoint/2010/main" val="933647405"/>
+      </p:ext>
+    </p:extLst>
+  </p:cSld>
+  <p:clrMapOvr>
+    <a:masterClrMapping/>
+  </p:clrMapOvr>
+</p:sld>
+</file>
+
+<file path=ppt/slides/slide39.xml><?xml version="1.0" encoding="utf-8"?>
+<p:sld xmlns:a="http://schemas.openxmlformats.org/drawingml/2006/main" xmlns:r="http://schemas.openxmlformats.org/officeDocument/2006/relationships" xmlns:p="http://schemas.openxmlformats.org/presentationml/2006/main">
+  <p:cSld>
+    <p:bg>
+      <p:bgPr>
+        <a:solidFill>
+          <a:schemeClr val="bg1"/>
+        </a:solidFill>
+        <a:effectLst/>
+      </p:bgPr>
+    </p:bg>
+    <p:spTree>
+      <p:nvGrpSpPr>
+        <p:cNvPr id="1" name=""/>
+        <p:cNvGrpSpPr/>
+        <p:nvPr/>
+      </p:nvGrpSpPr>
+      <p:grpSpPr>
+        <a:xfrm>
+          <a:off x="0" y="0"/>
+          <a:ext cx="0" cy="0"/>
+          <a:chOff x="0" y="0"/>
+          <a:chExt cx="0" cy="0"/>
+        </a:xfrm>
+      </p:grpSpPr>
       <p:sp>
         <p:nvSpPr>
           <p:cNvPr id="4" name="TextBox 3">
@@ -22327,7 +24050,7 @@
         </p:spPr>
         <p:txBody>
           <a:bodyPr vert="horz" lIns="91440" tIns="45720" rIns="91440" bIns="45720" rtlCol="0">
-            <a:normAutofit fontScale="92500" lnSpcReduction="10000"/>
+            <a:normAutofit/>
           </a:bodyPr>
           <a:lstStyle/>
           <a:p>
@@ -22340,10 +24063,10 @@
               </a:spcAft>
             </a:pPr>
             <a:r>
-              <a:rPr lang="en-US" sz="3000" b="1" dirty="0">
+              <a:rPr lang="en-US" sz="2800" dirty="0">
                 <a:latin typeface="+mj-lt"/>
               </a:rPr>
-              <a:t>232 BCE</a:t>
+              <a:t>227 BCE</a:t>
             </a:r>
           </a:p>
           <a:p>
@@ -22358,8 +24081,8 @@
               <a:buChar char="•"/>
             </a:pPr>
             <a:r>
-              <a:rPr lang="en-US" sz="2400" b="1" dirty="0"/>
-              <a:t>Ashoka the Great is ambushed by Hindu fanatics and drowned in the Ganges River.</a:t>
+              <a:rPr lang="en-US" sz="2400" dirty="0"/>
+              <a:t>Queen Teuta of Illyria acknowledges Roman overlordship.</a:t>
             </a:r>
           </a:p>
           <a:p>
@@ -22374,18 +24097,19 @@
               <a:buChar char="•"/>
             </a:pPr>
             <a:r>
-              <a:rPr lang="en-US" sz="2400" b="1" dirty="0"/>
-              <a:t>The empire falls into chaos as several kings in central and southern India and all the Hellenic satraps in Sindhia declare independence. His son and heir Dasharatha struggles to restore order.</a:t>
-            </a:r>
+              <a:rPr lang="en-US" sz="2400" dirty="0"/>
+              <a:t>Illyria becomes a client kingdom of Rome.</a:t>
+            </a:r>
+            <a:endParaRPr lang="en-US" sz="2400" b="1" dirty="0"/>
           </a:p>
         </p:txBody>
       </p:sp>
       <p:pic>
         <p:nvPicPr>
-          <p:cNvPr id="3" name="Picture 2">
+          <p:cNvPr id="6" name="Picture 5">
             <a:extLst>
               <a:ext uri="{FF2B5EF4-FFF2-40B4-BE49-F238E27FC236}">
-                <a16:creationId xmlns:a16="http://schemas.microsoft.com/office/drawing/2014/main" id="{DF48942B-53F6-45ED-9B7A-D117C19EB58F}"/>
+                <a16:creationId xmlns:a16="http://schemas.microsoft.com/office/drawing/2014/main" id="{49AD5D7C-48BD-447B-BC06-60739105A938}"/>
               </a:ext>
             </a:extLst>
           </p:cNvPr>
@@ -22395,14 +24119,14 @@
           <p:nvPr/>
         </p:nvPicPr>
         <p:blipFill rotWithShape="1">
-          <a:blip r:embed="rId3">
+          <a:blip r:embed="rId4">
             <a:extLst>
               <a:ext uri="{28A0092B-C50C-407E-A947-70E740481C1C}">
                 <a14:useLocalDpi xmlns:a14="http://schemas.microsoft.com/office/drawing/2010/main" val="0"/>
               </a:ext>
             </a:extLst>
           </a:blip>
-          <a:srcRect r="11232" b="1"/>
+          <a:srcRect l="3396" r="3396"/>
           <a:stretch/>
         </p:blipFill>
         <p:spPr>
@@ -22527,15 +24251,67 @@
           </a:custGeom>
         </p:spPr>
       </p:pic>
+      <p:sp>
+        <p:nvSpPr>
+          <p:cNvPr id="3" name="TextBox 2">
+            <a:extLst>
+              <a:ext uri="{FF2B5EF4-FFF2-40B4-BE49-F238E27FC236}">
+                <a16:creationId xmlns:a16="http://schemas.microsoft.com/office/drawing/2014/main" id="{187B37F2-9363-4F15-B835-D0077C7DA057}"/>
+              </a:ext>
+            </a:extLst>
+          </p:cNvPr>
+          <p:cNvSpPr txBox="1"/>
+          <p:nvPr/>
+        </p:nvSpPr>
+        <p:spPr>
+          <a:xfrm>
+            <a:off x="640080" y="335660"/>
+            <a:ext cx="3474720" cy="2215991"/>
+          </a:xfrm>
+          <a:prstGeom prst="rect">
+            <a:avLst/>
+          </a:prstGeom>
+          <a:noFill/>
+        </p:spPr>
+        <p:txBody>
+          <a:bodyPr wrap="square" rtlCol="0">
+            <a:spAutoFit/>
+          </a:bodyPr>
+          <a:lstStyle/>
+          <a:p>
+            <a:r>
+              <a:rPr lang="en-US" sz="1600" dirty="0"/>
+              <a:t>* “Illyria” here refers to the Kingdom of the </a:t>
+            </a:r>
+            <a:r>
+              <a:rPr lang="en-US" sz="1600" dirty="0" err="1"/>
+              <a:t>Ardiaei</a:t>
+            </a:r>
+            <a:r>
+              <a:rPr lang="en-US" sz="1600" dirty="0"/>
+              <a:t>; the rest of the Dalmatian coast and inlands are still largely under Celtic and Venetic influence.</a:t>
+            </a:r>
+          </a:p>
+          <a:p>
+            <a:endParaRPr lang="en-US" sz="800" dirty="0"/>
+          </a:p>
+          <a:p>
+            <a:r>
+              <a:rPr lang="en-US" sz="1600" dirty="0"/>
+              <a:t>**Sardinia and Corsica were annexed by Rome around 237 BCE after their rebellion from Carthage during the Mercenary War.</a:t>
+            </a:r>
+          </a:p>
+        </p:txBody>
+      </p:sp>
     </p:spTree>
     <p:extLst>
       <p:ext uri="{BB962C8B-B14F-4D97-AF65-F5344CB8AC3E}">
-        <p14:creationId xmlns:p14="http://schemas.microsoft.com/office/powerpoint/2010/main" val="2404304302"/>
+        <p14:creationId xmlns:p14="http://schemas.microsoft.com/office/powerpoint/2010/main" val="2860521322"/>
       </p:ext>
     </p:extLst>
   </p:cSld>
   <p:clrMapOvr>
-    <a:masterClrMapping/>
+    <a:overrideClrMapping bg1="lt1" tx1="dk1" bg2="lt2" tx2="dk2" accent1="accent1" accent2="accent2" accent3="accent3" accent4="accent4" accent5="accent5" accent6="accent6" hlink="hlink" folHlink="folHlink"/>
   </p:clrMapOvr>
 </p:sld>
 </file>
@@ -22796,6 +24572,460 @@
     <p:extLst>
       <p:ext uri="{BB962C8B-B14F-4D97-AF65-F5344CB8AC3E}">
         <p14:creationId xmlns:p14="http://schemas.microsoft.com/office/powerpoint/2010/main" val="185023302"/>
+      </p:ext>
+    </p:extLst>
+  </p:cSld>
+  <p:clrMapOvr>
+    <a:masterClrMapping/>
+  </p:clrMapOvr>
+</p:sld>
+</file>
+
+<file path=ppt/slides/slide40.xml><?xml version="1.0" encoding="utf-8"?>
+<p:sld xmlns:a="http://schemas.openxmlformats.org/drawingml/2006/main" xmlns:r="http://schemas.openxmlformats.org/officeDocument/2006/relationships" xmlns:p="http://schemas.openxmlformats.org/presentationml/2006/main">
+  <p:cSld>
+    <p:bg>
+      <p:bgPr>
+        <a:solidFill>
+          <a:schemeClr val="bg1"/>
+        </a:solidFill>
+        <a:effectLst/>
+      </p:bgPr>
+    </p:bg>
+    <p:spTree>
+      <p:nvGrpSpPr>
+        <p:cNvPr id="1" name=""/>
+        <p:cNvGrpSpPr/>
+        <p:nvPr/>
+      </p:nvGrpSpPr>
+      <p:grpSpPr>
+        <a:xfrm>
+          <a:off x="0" y="0"/>
+          <a:ext cx="0" cy="0"/>
+          <a:chOff x="0" y="0"/>
+          <a:chExt cx="0" cy="0"/>
+        </a:xfrm>
+      </p:grpSpPr>
+      <p:sp useBgFill="1">
+        <p:nvSpPr>
+          <p:cNvPr id="107" name="Rectangle 106">
+            <a:extLst>
+              <a:ext uri="{FF2B5EF4-FFF2-40B4-BE49-F238E27FC236}">
+                <a16:creationId xmlns:a16="http://schemas.microsoft.com/office/drawing/2014/main" id="{38468727-63BE-4191-B4A6-C30C82C0E986}"/>
+              </a:ext>
+              <a:ext uri="{C183D7F6-B498-43B3-948B-1728B52AA6E4}">
+                <adec:decorative xmlns:adec="http://schemas.microsoft.com/office/drawing/2017/decorative" val="1"/>
+              </a:ext>
+            </a:extLst>
+          </p:cNvPr>
+          <p:cNvSpPr>
+            <a:spLocks noGrp="1" noRot="1" noChangeAspect="1" noMove="1" noResize="1" noEditPoints="1" noAdjustHandles="1" noChangeArrowheads="1" noChangeShapeType="1" noTextEdit="1"/>
+          </p:cNvSpPr>
+          <p:nvPr>
+            <p:extLst>
+              <p:ext uri="{386F3935-93C4-4BCD-93E2-E3B085C9AB24}">
+                <p16:designElem xmlns:p16="http://schemas.microsoft.com/office/powerpoint/2015/main" val="1"/>
+              </p:ext>
+            </p:extLst>
+          </p:nvPr>
+        </p:nvSpPr>
+        <p:spPr>
+          <a:xfrm>
+            <a:off x="0" y="0"/>
+            <a:ext cx="12192000" cy="6858000"/>
+          </a:xfrm>
+          <a:prstGeom prst="rect">
+            <a:avLst/>
+          </a:prstGeom>
+          <a:ln>
+            <a:noFill/>
+          </a:ln>
+        </p:spPr>
+        <p:style>
+          <a:lnRef idx="2">
+            <a:schemeClr val="accent1">
+              <a:shade val="50000"/>
+            </a:schemeClr>
+          </a:lnRef>
+          <a:fillRef idx="1">
+            <a:schemeClr val="accent1"/>
+          </a:fillRef>
+          <a:effectRef idx="0">
+            <a:schemeClr val="accent1"/>
+          </a:effectRef>
+          <a:fontRef idx="minor">
+            <a:schemeClr val="lt1"/>
+          </a:fontRef>
+        </p:style>
+        <p:txBody>
+          <a:bodyPr rtlCol="0" anchor="ctr"/>
+          <a:lstStyle/>
+          <a:p>
+            <a:pPr algn="ctr"/>
+            <a:endParaRPr lang="en-US"/>
+          </a:p>
+        </p:txBody>
+      </p:sp>
+      <p:sp>
+        <p:nvSpPr>
+          <p:cNvPr id="109" name="Rectangle 108">
+            <a:extLst>
+              <a:ext uri="{FF2B5EF4-FFF2-40B4-BE49-F238E27FC236}">
+                <a16:creationId xmlns:a16="http://schemas.microsoft.com/office/drawing/2014/main" id="{9D355BB6-1BB8-4828-B246-CFB31742D7B8}"/>
+              </a:ext>
+              <a:ext uri="{C183D7F6-B498-43B3-948B-1728B52AA6E4}">
+                <adec:decorative xmlns:adec="http://schemas.microsoft.com/office/drawing/2017/decorative" val="1"/>
+              </a:ext>
+            </a:extLst>
+          </p:cNvPr>
+          <p:cNvSpPr>
+            <a:spLocks noGrp="1" noRot="1" noChangeAspect="1" noMove="1" noResize="1" noEditPoints="1" noAdjustHandles="1" noChangeArrowheads="1" noChangeShapeType="1" noTextEdit="1"/>
+          </p:cNvSpPr>
+          <p:nvPr>
+            <p:extLst>
+              <p:ext uri="{386F3935-93C4-4BCD-93E2-E3B085C9AB24}">
+                <p16:designElem xmlns:p16="http://schemas.microsoft.com/office/powerpoint/2015/main" val="1"/>
+              </p:ext>
+            </p:extLst>
+          </p:nvPr>
+        </p:nvSpPr>
+        <p:spPr>
+          <a:xfrm>
+            <a:off x="0" y="1134839"/>
+            <a:ext cx="128016" cy="653903"/>
+          </a:xfrm>
+          <a:prstGeom prst="rect">
+            <a:avLst/>
+          </a:prstGeom>
+          <a:solidFill>
+            <a:schemeClr val="accent2"/>
+          </a:solidFill>
+          <a:ln>
+            <a:noFill/>
+          </a:ln>
+        </p:spPr>
+        <p:style>
+          <a:lnRef idx="2">
+            <a:schemeClr val="accent1">
+              <a:shade val="50000"/>
+            </a:schemeClr>
+          </a:lnRef>
+          <a:fillRef idx="1">
+            <a:schemeClr val="accent1"/>
+          </a:fillRef>
+          <a:effectRef idx="0">
+            <a:schemeClr val="accent1"/>
+          </a:effectRef>
+          <a:fontRef idx="minor">
+            <a:schemeClr val="lt1"/>
+          </a:fontRef>
+        </p:style>
+        <p:txBody>
+          <a:bodyPr rtlCol="0" anchor="ctr"/>
+          <a:lstStyle/>
+          <a:p>
+            <a:pPr algn="ctr"/>
+            <a:endParaRPr lang="en-US">
+              <a:solidFill>
+                <a:prstClr val="white"/>
+              </a:solidFill>
+              <a:latin typeface="Calibri" panose="020F0502020204030204"/>
+            </a:endParaRPr>
+          </a:p>
+        </p:txBody>
+      </p:sp>
+      <p:sp>
+        <p:nvSpPr>
+          <p:cNvPr id="111" name="Rectangle 110">
+            <a:extLst>
+              <a:ext uri="{FF2B5EF4-FFF2-40B4-BE49-F238E27FC236}">
+                <a16:creationId xmlns:a16="http://schemas.microsoft.com/office/drawing/2014/main" id="{CA52A9B9-B2B3-46F0-9D53-0EFF9905BF8F}"/>
+              </a:ext>
+              <a:ext uri="{C183D7F6-B498-43B3-948B-1728B52AA6E4}">
+                <adec:decorative xmlns:adec="http://schemas.microsoft.com/office/drawing/2017/decorative" val="1"/>
+              </a:ext>
+            </a:extLst>
+          </p:cNvPr>
+          <p:cNvSpPr>
+            <a:spLocks noGrp="1" noRot="1" noChangeAspect="1" noMove="1" noResize="1" noEditPoints="1" noAdjustHandles="1" noChangeArrowheads="1" noChangeShapeType="1" noTextEdit="1"/>
+          </p:cNvSpPr>
+          <p:nvPr>
+            <p:extLst>
+              <p:ext uri="{386F3935-93C4-4BCD-93E2-E3B085C9AB24}">
+                <p16:designElem xmlns:p16="http://schemas.microsoft.com/office/powerpoint/2015/main" val="1"/>
+              </p:ext>
+            </p:extLst>
+          </p:nvPr>
+        </p:nvSpPr>
+        <p:spPr>
+          <a:xfrm rot="5400000">
+            <a:off x="2245238" y="1452646"/>
+            <a:ext cx="1463040" cy="18288"/>
+          </a:xfrm>
+          <a:prstGeom prst="rect">
+            <a:avLst/>
+          </a:prstGeom>
+          <a:solidFill>
+            <a:srgbClr val="D5D5D5"/>
+          </a:solidFill>
+          <a:ln w="3175">
+            <a:noFill/>
+          </a:ln>
+          <a:effectLst/>
+        </p:spPr>
+        <p:style>
+          <a:lnRef idx="2">
+            <a:schemeClr val="accent1">
+              <a:shade val="50000"/>
+            </a:schemeClr>
+          </a:lnRef>
+          <a:fillRef idx="1">
+            <a:schemeClr val="accent1"/>
+          </a:fillRef>
+          <a:effectRef idx="0">
+            <a:schemeClr val="accent1"/>
+          </a:effectRef>
+          <a:fontRef idx="minor">
+            <a:schemeClr val="lt1"/>
+          </a:fontRef>
+        </p:style>
+        <p:txBody>
+          <a:bodyPr rtlCol="0" anchor="ctr"/>
+          <a:lstStyle/>
+          <a:p>
+            <a:pPr marL="0" marR="0" lvl="0" indent="0" algn="ctr" defTabSz="914400" rtl="0" eaLnBrk="1" fontAlgn="auto" latinLnBrk="0" hangingPunct="1">
+              <a:lnSpc>
+                <a:spcPct val="100000"/>
+              </a:lnSpc>
+              <a:spcBef>
+                <a:spcPts val="0"/>
+              </a:spcBef>
+              <a:spcAft>
+                <a:spcPts val="0"/>
+              </a:spcAft>
+              <a:buClrTx/>
+              <a:buSzTx/>
+              <a:buFontTx/>
+              <a:buNone/>
+              <a:tabLst/>
+              <a:defRPr/>
+            </a:pPr>
+            <a:endParaRPr kumimoji="0" lang="en-US" sz="1800" b="0" i="0" u="none" strike="noStrike" kern="1200" cap="none" spc="0" normalizeH="0" baseline="0" noProof="0">
+              <a:ln>
+                <a:noFill/>
+              </a:ln>
+              <a:solidFill>
+                <a:prstClr val="white"/>
+              </a:solidFill>
+              <a:effectLst/>
+              <a:uLnTx/>
+              <a:uFillTx/>
+              <a:latin typeface="Calibri" panose="020F0502020204030204"/>
+              <a:ea typeface="+mn-ea"/>
+              <a:cs typeface="+mn-cs"/>
+            </a:endParaRPr>
+          </a:p>
+        </p:txBody>
+      </p:sp>
+      <p:sp>
+        <p:nvSpPr>
+          <p:cNvPr id="4" name="TextBox 3">
+            <a:extLst>
+              <a:ext uri="{FF2B5EF4-FFF2-40B4-BE49-F238E27FC236}">
+                <a16:creationId xmlns:a16="http://schemas.microsoft.com/office/drawing/2014/main" id="{03DDB894-502D-4473-8189-C7F7050B360F}"/>
+              </a:ext>
+            </a:extLst>
+          </p:cNvPr>
+          <p:cNvSpPr txBox="1"/>
+          <p:nvPr/>
+        </p:nvSpPr>
+        <p:spPr>
+          <a:xfrm>
+            <a:off x="3157538" y="412454"/>
+            <a:ext cx="3243262" cy="2101850"/>
+          </a:xfrm>
+          <a:prstGeom prst="rect">
+            <a:avLst/>
+          </a:prstGeom>
+        </p:spPr>
+        <p:txBody>
+          <a:bodyPr vert="horz" lIns="91440" tIns="45720" rIns="91440" bIns="45720" rtlCol="0" anchor="ctr">
+            <a:normAutofit/>
+          </a:bodyPr>
+          <a:lstStyle/>
+          <a:p>
+            <a:pPr defTabSz="914400">
+              <a:lnSpc>
+                <a:spcPct val="90000"/>
+              </a:lnSpc>
+              <a:spcAft>
+                <a:spcPts val="600"/>
+              </a:spcAft>
+            </a:pPr>
+            <a:r>
+              <a:rPr lang="en-US" sz="2800" b="1" dirty="0">
+                <a:latin typeface="+mj-lt"/>
+              </a:rPr>
+              <a:t>225 BCE</a:t>
+            </a:r>
+          </a:p>
+          <a:p>
+            <a:pPr marL="285750" indent="-228600" defTabSz="914400">
+              <a:lnSpc>
+                <a:spcPct val="90000"/>
+              </a:lnSpc>
+              <a:spcAft>
+                <a:spcPts val="600"/>
+              </a:spcAft>
+              <a:buFont typeface="Arial" panose="020B0604020202020204" pitchFamily="34" charset="0"/>
+              <a:buChar char="•"/>
+            </a:pPr>
+            <a:r>
+              <a:rPr lang="en-US" sz="1600" b="1" dirty="0"/>
+              <a:t>A renewed Qin offensive led by Wang Ben into Yue territory results in the completion of the </a:t>
+            </a:r>
+            <a:r>
+              <a:rPr lang="en-US" sz="1600" b="1" dirty="0" err="1"/>
+              <a:t>Lingqu</a:t>
+            </a:r>
+            <a:r>
+              <a:rPr lang="en-US" sz="1600" b="1" dirty="0"/>
+              <a:t> Canal. Wang Ben is made King of </a:t>
+            </a:r>
+            <a:r>
+              <a:rPr lang="en-US" sz="1600" b="1" dirty="0" err="1"/>
+              <a:t>Lingling</a:t>
+            </a:r>
+            <a:r>
+              <a:rPr lang="en-US" sz="1600" b="1" dirty="0"/>
+              <a:t>, which is incorporated into the Qin Empire.</a:t>
+            </a:r>
+          </a:p>
+        </p:txBody>
+      </p:sp>
+      <p:pic>
+        <p:nvPicPr>
+          <p:cNvPr id="6" name="Picture 5">
+            <a:extLst>
+              <a:ext uri="{FF2B5EF4-FFF2-40B4-BE49-F238E27FC236}">
+                <a16:creationId xmlns:a16="http://schemas.microsoft.com/office/drawing/2014/main" id="{49AD5D7C-48BD-447B-BC06-60739105A938}"/>
+              </a:ext>
+            </a:extLst>
+          </p:cNvPr>
+          <p:cNvPicPr>
+            <a:picLocks noChangeAspect="1"/>
+          </p:cNvPicPr>
+          <p:nvPr/>
+        </p:nvPicPr>
+        <p:blipFill rotWithShape="1">
+          <a:blip r:embed="rId3">
+            <a:extLst>
+              <a:ext uri="{28A0092B-C50C-407E-A947-70E740481C1C}">
+                <a14:useLocalDpi xmlns:a14="http://schemas.microsoft.com/office/drawing/2010/main" val="0"/>
+              </a:ext>
+            </a:extLst>
+          </a:blip>
+          <a:srcRect t="14961" r="-4" b="17588"/>
+          <a:stretch/>
+        </p:blipFill>
+        <p:spPr>
+          <a:xfrm>
+            <a:off x="20" y="2959630"/>
+            <a:ext cx="6400781" cy="3898370"/>
+          </a:xfrm>
+          <a:prstGeom prst="rect">
+            <a:avLst/>
+          </a:prstGeom>
+        </p:spPr>
+      </p:pic>
+      <p:pic>
+        <p:nvPicPr>
+          <p:cNvPr id="8" name="Picture 7">
+            <a:extLst>
+              <a:ext uri="{FF2B5EF4-FFF2-40B4-BE49-F238E27FC236}">
+                <a16:creationId xmlns:a16="http://schemas.microsoft.com/office/drawing/2014/main" id="{26229E2D-1CAB-422C-BDCD-21FF6BBF4947}"/>
+              </a:ext>
+            </a:extLst>
+          </p:cNvPr>
+          <p:cNvPicPr>
+            <a:picLocks noChangeAspect="1"/>
+          </p:cNvPicPr>
+          <p:nvPr/>
+        </p:nvPicPr>
+        <p:blipFill rotWithShape="1">
+          <a:blip r:embed="rId4">
+            <a:extLst>
+              <a:ext uri="{28A0092B-C50C-407E-A947-70E740481C1C}">
+                <a14:useLocalDpi xmlns:a14="http://schemas.microsoft.com/office/drawing/2010/main" val="0"/>
+              </a:ext>
+            </a:extLst>
+          </a:blip>
+          <a:srcRect l="3836" r="9293" b="2"/>
+          <a:stretch/>
+        </p:blipFill>
+        <p:spPr>
+          <a:xfrm>
+            <a:off x="6591299" y="1"/>
+            <a:ext cx="5600701" cy="6857999"/>
+          </a:xfrm>
+          <a:prstGeom prst="rect">
+            <a:avLst/>
+          </a:prstGeom>
+        </p:spPr>
+      </p:pic>
+      <p:sp>
+        <p:nvSpPr>
+          <p:cNvPr id="2" name="TextBox 1">
+            <a:extLst>
+              <a:ext uri="{FF2B5EF4-FFF2-40B4-BE49-F238E27FC236}">
+                <a16:creationId xmlns:a16="http://schemas.microsoft.com/office/drawing/2014/main" id="{A03DE87A-4E3A-4B91-B52E-7BDCA16B67D4}"/>
+              </a:ext>
+            </a:extLst>
+          </p:cNvPr>
+          <p:cNvSpPr txBox="1"/>
+          <p:nvPr/>
+        </p:nvSpPr>
+        <p:spPr>
+          <a:xfrm>
+            <a:off x="382530" y="730269"/>
+            <a:ext cx="2594228" cy="1200329"/>
+          </a:xfrm>
+          <a:prstGeom prst="rect">
+            <a:avLst/>
+          </a:prstGeom>
+          <a:noFill/>
+        </p:spPr>
+        <p:txBody>
+          <a:bodyPr wrap="square" rtlCol="0">
+            <a:spAutoFit/>
+          </a:bodyPr>
+          <a:lstStyle/>
+          <a:p>
+            <a:pPr>
+              <a:spcAft>
+                <a:spcPts val="600"/>
+              </a:spcAft>
+            </a:pPr>
+            <a:r>
+              <a:rPr lang="en-US" sz="1200" dirty="0"/>
+              <a:t>*In Italy, a confederation of Gallic tribes crosses the Alps and pillages Roman settlements in Etruria. The Romans call on these </a:t>
+            </a:r>
+            <a:r>
+              <a:rPr lang="en-US" sz="1200" dirty="0" err="1"/>
+              <a:t>Gauls</a:t>
+            </a:r>
+            <a:r>
+              <a:rPr lang="en-US" sz="1200" dirty="0"/>
+              <a:t>’ historic enemies, the Veneti, and begin driving them towards the coast of Tuscany.</a:t>
+            </a:r>
+            <a:endParaRPr lang="en-US" sz="300" dirty="0"/>
+          </a:p>
+        </p:txBody>
+      </p:sp>
+    </p:spTree>
+    <p:extLst>
+      <p:ext uri="{BB962C8B-B14F-4D97-AF65-F5344CB8AC3E}">
+        <p14:creationId xmlns:p14="http://schemas.microsoft.com/office/powerpoint/2010/main" val="3280594485"/>
       </p:ext>
     </p:extLst>
   </p:cSld>
@@ -24943,4 +27173,47 @@
     </a:ext>
   </a:extLst>
 </a:theme>
+</file>
+
+<file path=ppt/theme/themeOverride1.xml><?xml version="1.0" encoding="utf-8"?>
+<a:themeOverride xmlns:a="http://schemas.openxmlformats.org/drawingml/2006/main">
+  <a:clrScheme name="Office Theme">
+    <a:dk1>
+      <a:sysClr val="windowText" lastClr="000000"/>
+    </a:dk1>
+    <a:lt1>
+      <a:sysClr val="window" lastClr="FFFFFF"/>
+    </a:lt1>
+    <a:dk2>
+      <a:srgbClr val="44546A"/>
+    </a:dk2>
+    <a:lt2>
+      <a:srgbClr val="E7E6E6"/>
+    </a:lt2>
+    <a:accent1>
+      <a:srgbClr val="4472C4"/>
+    </a:accent1>
+    <a:accent2>
+      <a:srgbClr val="ED7D31"/>
+    </a:accent2>
+    <a:accent3>
+      <a:srgbClr val="A5A5A5"/>
+    </a:accent3>
+    <a:accent4>
+      <a:srgbClr val="FFC000"/>
+    </a:accent4>
+    <a:accent5>
+      <a:srgbClr val="5B9BD5"/>
+    </a:accent5>
+    <a:accent6>
+      <a:srgbClr val="70AD47"/>
+    </a:accent6>
+    <a:hlink>
+      <a:srgbClr val="0563C1"/>
+    </a:hlink>
+    <a:folHlink>
+      <a:srgbClr val="954F72"/>
+    </a:folHlink>
+  </a:clrScheme>
+</a:themeOverride>
 </file>
</xml_diff>